<commit_message>
add microquiz-mar1.pptx cantor-for-pdf.pptx, update halting-problem.pptx
</commit_message>
<xml_diff>
--- a/spring13/slides13/halting-problem.pptx
+++ b/spring13/slides13/halting-problem.pptx
@@ -6,10 +6,10 @@
     <p:sldMasterId id="2147483664" r:id="rId2"/>
   </p:sldMasterIdLst>
   <p:notesMasterIdLst>
-    <p:notesMasterId r:id="rId8"/>
+    <p:notesMasterId r:id="rId14"/>
   </p:notesMasterIdLst>
   <p:handoutMasterIdLst>
-    <p:handoutMasterId r:id="rId9"/>
+    <p:handoutMasterId r:id="rId15"/>
   </p:handoutMasterIdLst>
   <p:sldIdLst>
     <p:sldId id="257" r:id="rId3"/>
@@ -17,11 +17,17 @@
     <p:sldId id="363" r:id="rId5"/>
     <p:sldId id="364" r:id="rId6"/>
     <p:sldId id="380" r:id="rId7"/>
+    <p:sldId id="381" r:id="rId8"/>
+    <p:sldId id="382" r:id="rId9"/>
+    <p:sldId id="383" r:id="rId10"/>
+    <p:sldId id="384" r:id="rId11"/>
+    <p:sldId id="385" r:id="rId12"/>
+    <p:sldId id="386" r:id="rId13"/>
   </p:sldIdLst>
   <p:sldSz cx="9144000" cy="6858000" type="screen4x3"/>
   <p:notesSz cx="9601200" cy="7315200"/>
   <p:custDataLst>
-    <p:tags r:id="rId11"/>
+    <p:tags r:id="rId17"/>
   </p:custDataLst>
   <p:defaultTextStyle>
     <a:defPPr>
@@ -2869,23 +2875,7 @@
                 <a:latin typeface="Comic Sans MS" pitchFamily="66" charset="0"/>
                 <a:cs typeface="Comic Sans MS"/>
               </a:rPr>
-              <a:t>Albert R Meyer,      March </a:t>
-            </a:r>
-            <a:r>
-              <a:rPr kumimoji="0" lang="en-US" sz="1200" b="0" i="0" u="none" strike="noStrike" kern="1200" cap="none" spc="0" normalizeH="0" baseline="0" noProof="0" dirty="0" smtClean="0">
-                <a:ln>
-                  <a:noFill/>
-                </a:ln>
-                <a:solidFill>
-                  <a:schemeClr val="tx1"/>
-                </a:solidFill>
-                <a:effectLst/>
-                <a:uLnTx/>
-                <a:uFillTx/>
-                <a:latin typeface="Comic Sans MS" pitchFamily="66" charset="0"/>
-                <a:cs typeface="Comic Sans MS"/>
-              </a:rPr>
-              <a:t>4, 2013</a:t>
+              <a:t>Albert R Meyer,      March 4, 2013</a:t>
             </a:r>
             <a:endParaRPr kumimoji="0" lang="en-US" sz="1200" b="0" i="0" u="none" strike="noStrike" kern="1200" cap="none" spc="0" normalizeH="0" baseline="0" noProof="0" dirty="0">
               <a:ln>
@@ -3575,17 +3565,7 @@
                 <a:latin typeface="Comic Sans MS" pitchFamily="66" charset="0"/>
                 <a:cs typeface="Arial"/>
               </a:rPr>
-              <a:t>Albert R Meyer,        </a:t>
-            </a:r>
-            <a:r>
-              <a:rPr lang="en-US" sz="1200" dirty="0" smtClean="0">
-                <a:solidFill>
-                  <a:srgbClr val="000000"/>
-                </a:solidFill>
-                <a:latin typeface="Comic Sans MS" pitchFamily="66" charset="0"/>
-                <a:cs typeface="Arial"/>
-              </a:rPr>
-              <a:t>March 4, 2013</a:t>
+              <a:t>Albert R Meyer,        March 4, 2013</a:t>
             </a:r>
             <a:endParaRPr lang="en-US" sz="1200" dirty="0">
               <a:solidFill>
@@ -4243,6 +4223,1136 @@
 </p:sld>
 </file>
 
+<file path=ppt/slides/slide10.xml><?xml version="1.0" encoding="utf-8"?>
+<p:sld xmlns:a="http://schemas.openxmlformats.org/drawingml/2006/main" xmlns:r="http://schemas.openxmlformats.org/officeDocument/2006/relationships" xmlns:p="http://schemas.openxmlformats.org/presentationml/2006/main">
+  <p:cSld>
+    <p:spTree>
+      <p:nvGrpSpPr>
+        <p:cNvPr id="1" name=""/>
+        <p:cNvGrpSpPr/>
+        <p:nvPr/>
+      </p:nvGrpSpPr>
+      <p:grpSpPr>
+        <a:xfrm>
+          <a:off x="0" y="0"/>
+          <a:ext cx="0" cy="0"/>
+          <a:chOff x="0" y="0"/>
+          <a:chExt cx="0" cy="0"/>
+        </a:xfrm>
+      </p:grpSpPr>
+      <p:sp>
+        <p:nvSpPr>
+          <p:cNvPr id="2" name="Title 1"/>
+          <p:cNvSpPr>
+            <a:spLocks noGrp="1"/>
+          </p:cNvSpPr>
+          <p:nvPr>
+            <p:ph type="title"/>
+          </p:nvPr>
+        </p:nvSpPr>
+        <p:spPr>
+          <a:xfrm>
+            <a:off x="1660549" y="363538"/>
+            <a:ext cx="6794500" cy="1003300"/>
+          </a:xfrm>
+        </p:spPr>
+        <p:txBody>
+          <a:bodyPr/>
+          <a:lstStyle/>
+          <a:p>
+            <a:r>
+              <a:rPr lang="en-US" dirty="0" smtClean="0"/>
+              <a:t>The Halting Problem</a:t>
+            </a:r>
+            <a:endParaRPr lang="en-US" dirty="0"/>
+          </a:p>
+        </p:txBody>
+      </p:sp>
+      <p:sp>
+        <p:nvSpPr>
+          <p:cNvPr id="3" name="Content Placeholder 2"/>
+          <p:cNvSpPr>
+            <a:spLocks noGrp="1"/>
+          </p:cNvSpPr>
+          <p:nvPr>
+            <p:ph idx="1"/>
+          </p:nvPr>
+        </p:nvSpPr>
+        <p:spPr>
+          <a:xfrm>
+            <a:off x="439025" y="1390139"/>
+            <a:ext cx="8431646" cy="5054901"/>
+          </a:xfrm>
+        </p:spPr>
+        <p:txBody>
+          <a:bodyPr/>
+          <a:lstStyle/>
+          <a:p>
+            <a:r>
+              <a:rPr lang="en-US" sz="3600" dirty="0"/>
+              <a:t>Let </a:t>
+            </a:r>
+            <a:r>
+              <a:rPr lang="en-US" sz="3600" dirty="0">
+                <a:solidFill>
+                  <a:srgbClr val="0000FF"/>
+                </a:solidFill>
+              </a:rPr>
+              <a:t>t</a:t>
+            </a:r>
+            <a:r>
+              <a:rPr lang="en-US" sz="3600" dirty="0"/>
+              <a:t> be the text </a:t>
+            </a:r>
+            <a:r>
+              <a:rPr lang="en-US" sz="3600" dirty="0" smtClean="0"/>
+              <a:t>for </a:t>
+            </a:r>
+            <a:r>
+              <a:rPr lang="en-US" sz="3600" dirty="0" smtClean="0">
+                <a:solidFill>
+                  <a:srgbClr val="9933FF"/>
+                </a:solidFill>
+              </a:rPr>
+              <a:t>Q’</a:t>
+            </a:r>
+            <a:endParaRPr lang="en-US" sz="3600" dirty="0">
+              <a:solidFill>
+                <a:srgbClr val="9933FF"/>
+              </a:solidFill>
+            </a:endParaRPr>
+          </a:p>
+          <a:p>
+            <a:r>
+              <a:rPr lang="en-US" sz="3600" dirty="0"/>
+              <a:t>So by </a:t>
+            </a:r>
+            <a:r>
+              <a:rPr lang="en-US" sz="3600" dirty="0" err="1" smtClean="0"/>
+              <a:t>def</a:t>
+            </a:r>
+            <a:r>
+              <a:rPr lang="en-US" sz="3600" dirty="0" smtClean="0"/>
+              <a:t> </a:t>
+            </a:r>
+            <a:r>
+              <a:rPr lang="en-US" sz="3600" dirty="0"/>
+              <a:t>of </a:t>
+            </a:r>
+            <a:r>
+              <a:rPr lang="en-US" sz="3600" dirty="0">
+                <a:solidFill>
+                  <a:srgbClr val="F50802"/>
+                </a:solidFill>
+              </a:rPr>
+              <a:t>HALTS</a:t>
+            </a:r>
+            <a:r>
+              <a:rPr lang="en-US" sz="3600" dirty="0"/>
+              <a:t>:</a:t>
+            </a:r>
+          </a:p>
+          <a:p>
+            <a:r>
+              <a:rPr lang="en-US" sz="3600" dirty="0"/>
+              <a:t>  </a:t>
+            </a:r>
+            <a:r>
+              <a:rPr lang="en-US" sz="3600" dirty="0" smtClean="0">
+                <a:solidFill>
+                  <a:srgbClr val="0000FF"/>
+                </a:solidFill>
+              </a:rPr>
+              <a:t>t</a:t>
+            </a:r>
+            <a:r>
+              <a:rPr lang="en-US" sz="3600" dirty="0" smtClean="0"/>
+              <a:t> </a:t>
+            </a:r>
+            <a:r>
+              <a:rPr lang="en-US" sz="3600" dirty="0">
+                <a:solidFill>
+                  <a:srgbClr val="F50802"/>
+                </a:solidFill>
+              </a:rPr>
+              <a:t>HALTS</a:t>
+            </a:r>
+            <a:r>
+              <a:rPr lang="en-US" sz="3600" dirty="0"/>
+              <a:t> </a:t>
+            </a:r>
+            <a:r>
+              <a:rPr lang="en-US" sz="3600" dirty="0" err="1"/>
+              <a:t>iff</a:t>
+            </a:r>
+            <a:r>
+              <a:rPr lang="en-US" sz="3600" dirty="0"/>
+              <a:t> </a:t>
+            </a:r>
+            <a:r>
+              <a:rPr lang="en-US" sz="3600" dirty="0">
+                <a:solidFill>
+                  <a:srgbClr val="9933FF"/>
+                </a:solidFill>
+              </a:rPr>
+              <a:t>Q'</a:t>
+            </a:r>
+            <a:r>
+              <a:rPr lang="en-US" sz="3600" dirty="0"/>
+              <a:t>(</a:t>
+            </a:r>
+            <a:r>
+              <a:rPr lang="en-US" sz="3600" dirty="0">
+                <a:solidFill>
+                  <a:srgbClr val="0000FF"/>
+                </a:solidFill>
+              </a:rPr>
+              <a:t>t</a:t>
+            </a:r>
+            <a:r>
+              <a:rPr lang="en-US" sz="3600" dirty="0"/>
+              <a:t>) returns something</a:t>
+            </a:r>
+          </a:p>
+          <a:p>
+            <a:r>
+              <a:rPr lang="en-US" sz="3600" dirty="0"/>
+              <a:t>and by </a:t>
+            </a:r>
+            <a:r>
+              <a:rPr lang="en-US" sz="3600" dirty="0" err="1"/>
+              <a:t>def</a:t>
+            </a:r>
+            <a:r>
+              <a:rPr lang="en-US" sz="3600" dirty="0"/>
+              <a:t> of </a:t>
+            </a:r>
+            <a:r>
+              <a:rPr lang="en-US" sz="3600" dirty="0">
+                <a:solidFill>
+                  <a:srgbClr val="9933FF"/>
+                </a:solidFill>
+              </a:rPr>
+              <a:t>Q'</a:t>
+            </a:r>
+          </a:p>
+          <a:p>
+            <a:r>
+              <a:rPr lang="en-US" sz="3600" dirty="0"/>
+              <a:t>  </a:t>
+            </a:r>
+            <a:r>
+              <a:rPr lang="en-US" sz="3600" dirty="0" smtClean="0">
+                <a:solidFill>
+                  <a:srgbClr val="9933FF"/>
+                </a:solidFill>
+              </a:rPr>
+              <a:t>Q</a:t>
+            </a:r>
+            <a:r>
+              <a:rPr lang="en-US" sz="3600" dirty="0">
+                <a:solidFill>
+                  <a:srgbClr val="9933FF"/>
+                </a:solidFill>
+              </a:rPr>
+              <a:t>'</a:t>
+            </a:r>
+            <a:r>
+              <a:rPr lang="en-US" sz="3600" dirty="0"/>
+              <a:t>(</a:t>
+            </a:r>
+            <a:r>
+              <a:rPr lang="en-US" sz="3600" dirty="0">
+                <a:solidFill>
+                  <a:srgbClr val="0000FF"/>
+                </a:solidFill>
+              </a:rPr>
+              <a:t>t</a:t>
+            </a:r>
+            <a:r>
+              <a:rPr lang="en-US" sz="3600" dirty="0"/>
+              <a:t>) returns something </a:t>
+            </a:r>
+            <a:r>
+              <a:rPr lang="en-US" sz="3600" dirty="0" err="1"/>
+              <a:t>iff</a:t>
+            </a:r>
+            <a:r>
+              <a:rPr lang="en-US" sz="3600" dirty="0"/>
+              <a:t> </a:t>
+            </a:r>
+            <a:r>
+              <a:rPr lang="en-US" sz="3600" dirty="0">
+                <a:solidFill>
+                  <a:srgbClr val="0000FF"/>
+                </a:solidFill>
+              </a:rPr>
+              <a:t>t</a:t>
+            </a:r>
+            <a:r>
+              <a:rPr lang="en-US" sz="3600" dirty="0"/>
+              <a:t> does </a:t>
+            </a:r>
+            <a:r>
+              <a:rPr lang="en-US" sz="3600" dirty="0">
+                <a:solidFill>
+                  <a:srgbClr val="F50802"/>
+                </a:solidFill>
+              </a:rPr>
+              <a:t>not</a:t>
+            </a:r>
+            <a:r>
+              <a:rPr lang="en-US" sz="3600" dirty="0"/>
+              <a:t> </a:t>
+            </a:r>
+            <a:r>
+              <a:rPr lang="en-US" sz="3600" dirty="0">
+                <a:solidFill>
+                  <a:srgbClr val="F50802"/>
+                </a:solidFill>
+              </a:rPr>
+              <a:t>HALT</a:t>
+            </a:r>
+            <a:r>
+              <a:rPr lang="en-US" sz="3600" dirty="0"/>
+              <a:t>.</a:t>
+            </a:r>
+          </a:p>
+        </p:txBody>
+      </p:sp>
+    </p:spTree>
+    <p:extLst>
+      <p:ext uri="{BB962C8B-B14F-4D97-AF65-F5344CB8AC3E}">
+        <p14:creationId xmlns:p14="http://schemas.microsoft.com/office/powerpoint/2010/main" val="1256317703"/>
+      </p:ext>
+    </p:extLst>
+  </p:cSld>
+  <p:clrMapOvr>
+    <a:masterClrMapping/>
+  </p:clrMapOvr>
+  <p:transition xmlns:p14="http://schemas.microsoft.com/office/powerpoint/2010/main" spd="slow">
+    <p:fade/>
+  </p:transition>
+  <p:timing>
+    <p:tnLst>
+      <p:par>
+        <p:cTn xmlns:p14="http://schemas.microsoft.com/office/powerpoint/2010/main" id="1" dur="indefinite" restart="never" nodeType="tmRoot">
+          <p:childTnLst>
+            <p:seq concurrent="1" nextAc="seek">
+              <p:cTn id="2" dur="indefinite" nodeType="mainSeq">
+                <p:childTnLst>
+                  <p:par>
+                    <p:cTn id="3" fill="hold">
+                      <p:stCondLst>
+                        <p:cond delay="indefinite"/>
+                      </p:stCondLst>
+                      <p:childTnLst>
+                        <p:par>
+                          <p:cTn id="4" fill="hold">
+                            <p:stCondLst>
+                              <p:cond delay="0"/>
+                            </p:stCondLst>
+                            <p:childTnLst>
+                              <p:par>
+                                <p:cTn id="5" presetID="9" presetClass="entr" presetSubtype="0" fill="hold" nodeType="clickEffect">
+                                  <p:stCondLst>
+                                    <p:cond delay="0"/>
+                                  </p:stCondLst>
+                                  <p:childTnLst>
+                                    <p:set>
+                                      <p:cBhvr>
+                                        <p:cTn id="6" dur="1" fill="hold">
+                                          <p:stCondLst>
+                                            <p:cond delay="0"/>
+                                          </p:stCondLst>
+                                        </p:cTn>
+                                        <p:tgtEl>
+                                          <p:spTgt spid="3">
+                                            <p:txEl>
+                                              <p:pRg st="1" end="1"/>
+                                            </p:txEl>
+                                          </p:spTgt>
+                                        </p:tgtEl>
+                                        <p:attrNameLst>
+                                          <p:attrName>style.visibility</p:attrName>
+                                        </p:attrNameLst>
+                                      </p:cBhvr>
+                                      <p:to>
+                                        <p:strVal val="visible"/>
+                                      </p:to>
+                                    </p:set>
+                                    <p:animEffect transition="in" filter="dissolve">
+                                      <p:cBhvr>
+                                        <p:cTn id="7" dur="500"/>
+                                        <p:tgtEl>
+                                          <p:spTgt spid="3">
+                                            <p:txEl>
+                                              <p:pRg st="1" end="1"/>
+                                            </p:txEl>
+                                          </p:spTgt>
+                                        </p:tgtEl>
+                                      </p:cBhvr>
+                                    </p:animEffect>
+                                  </p:childTnLst>
+                                </p:cTn>
+                              </p:par>
+                            </p:childTnLst>
+                          </p:cTn>
+                        </p:par>
+                      </p:childTnLst>
+                    </p:cTn>
+                  </p:par>
+                  <p:par>
+                    <p:cTn id="8" fill="hold">
+                      <p:stCondLst>
+                        <p:cond delay="indefinite"/>
+                      </p:stCondLst>
+                      <p:childTnLst>
+                        <p:par>
+                          <p:cTn id="9" fill="hold">
+                            <p:stCondLst>
+                              <p:cond delay="0"/>
+                            </p:stCondLst>
+                            <p:childTnLst>
+                              <p:par>
+                                <p:cTn id="10" presetID="9" presetClass="entr" presetSubtype="0" fill="hold" nodeType="clickEffect">
+                                  <p:stCondLst>
+                                    <p:cond delay="0"/>
+                                  </p:stCondLst>
+                                  <p:childTnLst>
+                                    <p:set>
+                                      <p:cBhvr>
+                                        <p:cTn id="11" dur="1" fill="hold">
+                                          <p:stCondLst>
+                                            <p:cond delay="0"/>
+                                          </p:stCondLst>
+                                        </p:cTn>
+                                        <p:tgtEl>
+                                          <p:spTgt spid="3">
+                                            <p:txEl>
+                                              <p:pRg st="2" end="2"/>
+                                            </p:txEl>
+                                          </p:spTgt>
+                                        </p:tgtEl>
+                                        <p:attrNameLst>
+                                          <p:attrName>style.visibility</p:attrName>
+                                        </p:attrNameLst>
+                                      </p:cBhvr>
+                                      <p:to>
+                                        <p:strVal val="visible"/>
+                                      </p:to>
+                                    </p:set>
+                                    <p:animEffect transition="in" filter="dissolve">
+                                      <p:cBhvr>
+                                        <p:cTn id="12" dur="500"/>
+                                        <p:tgtEl>
+                                          <p:spTgt spid="3">
+                                            <p:txEl>
+                                              <p:pRg st="2" end="2"/>
+                                            </p:txEl>
+                                          </p:spTgt>
+                                        </p:tgtEl>
+                                      </p:cBhvr>
+                                    </p:animEffect>
+                                  </p:childTnLst>
+                                </p:cTn>
+                              </p:par>
+                            </p:childTnLst>
+                          </p:cTn>
+                        </p:par>
+                      </p:childTnLst>
+                    </p:cTn>
+                  </p:par>
+                  <p:par>
+                    <p:cTn id="13" fill="hold">
+                      <p:stCondLst>
+                        <p:cond delay="indefinite"/>
+                      </p:stCondLst>
+                      <p:childTnLst>
+                        <p:par>
+                          <p:cTn id="14" fill="hold">
+                            <p:stCondLst>
+                              <p:cond delay="0"/>
+                            </p:stCondLst>
+                            <p:childTnLst>
+                              <p:par>
+                                <p:cTn id="15" presetID="9" presetClass="entr" presetSubtype="0" fill="hold" nodeType="clickEffect">
+                                  <p:stCondLst>
+                                    <p:cond delay="0"/>
+                                  </p:stCondLst>
+                                  <p:childTnLst>
+                                    <p:set>
+                                      <p:cBhvr>
+                                        <p:cTn id="16" dur="1" fill="hold">
+                                          <p:stCondLst>
+                                            <p:cond delay="0"/>
+                                          </p:stCondLst>
+                                        </p:cTn>
+                                        <p:tgtEl>
+                                          <p:spTgt spid="3">
+                                            <p:txEl>
+                                              <p:pRg st="3" end="3"/>
+                                            </p:txEl>
+                                          </p:spTgt>
+                                        </p:tgtEl>
+                                        <p:attrNameLst>
+                                          <p:attrName>style.visibility</p:attrName>
+                                        </p:attrNameLst>
+                                      </p:cBhvr>
+                                      <p:to>
+                                        <p:strVal val="visible"/>
+                                      </p:to>
+                                    </p:set>
+                                    <p:animEffect transition="in" filter="dissolve">
+                                      <p:cBhvr>
+                                        <p:cTn id="17" dur="500"/>
+                                        <p:tgtEl>
+                                          <p:spTgt spid="3">
+                                            <p:txEl>
+                                              <p:pRg st="3" end="3"/>
+                                            </p:txEl>
+                                          </p:spTgt>
+                                        </p:tgtEl>
+                                      </p:cBhvr>
+                                    </p:animEffect>
+                                  </p:childTnLst>
+                                </p:cTn>
+                              </p:par>
+                            </p:childTnLst>
+                          </p:cTn>
+                        </p:par>
+                      </p:childTnLst>
+                    </p:cTn>
+                  </p:par>
+                  <p:par>
+                    <p:cTn id="18" fill="hold">
+                      <p:stCondLst>
+                        <p:cond delay="indefinite"/>
+                      </p:stCondLst>
+                      <p:childTnLst>
+                        <p:par>
+                          <p:cTn id="19" fill="hold">
+                            <p:stCondLst>
+                              <p:cond delay="0"/>
+                            </p:stCondLst>
+                            <p:childTnLst>
+                              <p:par>
+                                <p:cTn id="20" presetID="9" presetClass="entr" presetSubtype="0" fill="hold" nodeType="clickEffect">
+                                  <p:stCondLst>
+                                    <p:cond delay="0"/>
+                                  </p:stCondLst>
+                                  <p:childTnLst>
+                                    <p:set>
+                                      <p:cBhvr>
+                                        <p:cTn id="21" dur="1" fill="hold">
+                                          <p:stCondLst>
+                                            <p:cond delay="0"/>
+                                          </p:stCondLst>
+                                        </p:cTn>
+                                        <p:tgtEl>
+                                          <p:spTgt spid="3">
+                                            <p:txEl>
+                                              <p:pRg st="4" end="4"/>
+                                            </p:txEl>
+                                          </p:spTgt>
+                                        </p:tgtEl>
+                                        <p:attrNameLst>
+                                          <p:attrName>style.visibility</p:attrName>
+                                        </p:attrNameLst>
+                                      </p:cBhvr>
+                                      <p:to>
+                                        <p:strVal val="visible"/>
+                                      </p:to>
+                                    </p:set>
+                                    <p:animEffect transition="in" filter="dissolve">
+                                      <p:cBhvr>
+                                        <p:cTn id="22" dur="500"/>
+                                        <p:tgtEl>
+                                          <p:spTgt spid="3">
+                                            <p:txEl>
+                                              <p:pRg st="4" end="4"/>
+                                            </p:txEl>
+                                          </p:spTgt>
+                                        </p:tgtEl>
+                                      </p:cBhvr>
+                                    </p:animEffect>
+                                  </p:childTnLst>
+                                </p:cTn>
+                              </p:par>
+                            </p:childTnLst>
+                          </p:cTn>
+                        </p:par>
+                      </p:childTnLst>
+                    </p:cTn>
+                  </p:par>
+                </p:childTnLst>
+              </p:cTn>
+              <p:prevCondLst>
+                <p:cond evt="onPrev" delay="0">
+                  <p:tgtEl>
+                    <p:sldTgt/>
+                  </p:tgtEl>
+                </p:cond>
+              </p:prevCondLst>
+              <p:nextCondLst>
+                <p:cond evt="onNext" delay="0">
+                  <p:tgtEl>
+                    <p:sldTgt/>
+                  </p:tgtEl>
+                </p:cond>
+              </p:nextCondLst>
+            </p:seq>
+          </p:childTnLst>
+        </p:cTn>
+      </p:par>
+    </p:tnLst>
+  </p:timing>
+</p:sld>
+</file>
+
+<file path=ppt/slides/slide11.xml><?xml version="1.0" encoding="utf-8"?>
+<p:sld xmlns:a="http://schemas.openxmlformats.org/drawingml/2006/main" xmlns:r="http://schemas.openxmlformats.org/officeDocument/2006/relationships" xmlns:p="http://schemas.openxmlformats.org/presentationml/2006/main">
+  <p:cSld>
+    <p:spTree>
+      <p:nvGrpSpPr>
+        <p:cNvPr id="1" name=""/>
+        <p:cNvGrpSpPr/>
+        <p:nvPr/>
+      </p:nvGrpSpPr>
+      <p:grpSpPr>
+        <a:xfrm>
+          <a:off x="0" y="0"/>
+          <a:ext cx="0" cy="0"/>
+          <a:chOff x="0" y="0"/>
+          <a:chExt cx="0" cy="0"/>
+        </a:xfrm>
+      </p:grpSpPr>
+      <p:sp>
+        <p:nvSpPr>
+          <p:cNvPr id="2" name="Title 1"/>
+          <p:cNvSpPr>
+            <a:spLocks noGrp="1"/>
+          </p:cNvSpPr>
+          <p:nvPr>
+            <p:ph type="title"/>
+          </p:nvPr>
+        </p:nvSpPr>
+        <p:spPr>
+          <a:xfrm>
+            <a:off x="1660549" y="363538"/>
+            <a:ext cx="6794500" cy="1003300"/>
+          </a:xfrm>
+        </p:spPr>
+        <p:txBody>
+          <a:bodyPr/>
+          <a:lstStyle/>
+          <a:p>
+            <a:r>
+              <a:rPr lang="en-US" dirty="0" smtClean="0"/>
+              <a:t>The Halting Problem</a:t>
+            </a:r>
+            <a:endParaRPr lang="en-US" dirty="0"/>
+          </a:p>
+        </p:txBody>
+      </p:sp>
+      <p:sp>
+        <p:nvSpPr>
+          <p:cNvPr id="3" name="Content Placeholder 2"/>
+          <p:cNvSpPr>
+            <a:spLocks noGrp="1"/>
+          </p:cNvSpPr>
+          <p:nvPr>
+            <p:ph idx="1"/>
+          </p:nvPr>
+        </p:nvSpPr>
+        <p:spPr>
+          <a:xfrm>
+            <a:off x="439025" y="1390139"/>
+            <a:ext cx="8431646" cy="5054901"/>
+          </a:xfrm>
+        </p:spPr>
+        <p:txBody>
+          <a:bodyPr/>
+          <a:lstStyle/>
+          <a:p>
+            <a:r>
+              <a:rPr lang="en-US" sz="3600" dirty="0"/>
+              <a:t>CONTRADICTION: </a:t>
+            </a:r>
+            <a:endParaRPr lang="en-US" sz="3600" dirty="0" smtClean="0"/>
+          </a:p>
+          <a:p>
+            <a:r>
+              <a:rPr lang="en-US" sz="4400" dirty="0" smtClean="0">
+                <a:solidFill>
+                  <a:srgbClr val="0000FF"/>
+                </a:solidFill>
+              </a:rPr>
+              <a:t>t </a:t>
+            </a:r>
+            <a:r>
+              <a:rPr lang="en-US" sz="4400" dirty="0">
+                <a:solidFill>
+                  <a:srgbClr val="F50802"/>
+                </a:solidFill>
+              </a:rPr>
+              <a:t>HALTS</a:t>
+            </a:r>
+            <a:r>
+              <a:rPr lang="en-US" sz="4400" dirty="0"/>
+              <a:t> </a:t>
+            </a:r>
+            <a:r>
+              <a:rPr lang="en-US" sz="4400" dirty="0" err="1"/>
+              <a:t>iff</a:t>
+            </a:r>
+            <a:r>
+              <a:rPr lang="en-US" sz="4400" dirty="0"/>
+              <a:t> </a:t>
+            </a:r>
+            <a:r>
+              <a:rPr lang="en-US" sz="4400" dirty="0">
+                <a:solidFill>
+                  <a:srgbClr val="0000FF"/>
+                </a:solidFill>
+              </a:rPr>
+              <a:t>t </a:t>
+            </a:r>
+            <a:r>
+              <a:rPr lang="en-US" sz="4400" dirty="0"/>
+              <a:t>does </a:t>
+            </a:r>
+            <a:r>
+              <a:rPr lang="en-US" sz="4400" dirty="0">
+                <a:solidFill>
+                  <a:srgbClr val="F50802"/>
+                </a:solidFill>
+              </a:rPr>
+              <a:t>not </a:t>
+            </a:r>
+            <a:r>
+              <a:rPr lang="en-US" sz="4400" dirty="0" smtClean="0">
+                <a:solidFill>
+                  <a:srgbClr val="F50802"/>
+                </a:solidFill>
+              </a:rPr>
+              <a:t>HALT</a:t>
+            </a:r>
+          </a:p>
+          <a:p>
+            <a:r>
+              <a:rPr lang="en-US" sz="4400" dirty="0" smtClean="0"/>
+              <a:t>There </a:t>
+            </a:r>
+            <a:r>
+              <a:rPr lang="en-US" sz="4400" dirty="0"/>
+              <a:t>can't be such a </a:t>
+            </a:r>
+            <a:r>
+              <a:rPr lang="en-US" sz="4400" dirty="0">
+                <a:solidFill>
+                  <a:srgbClr val="9933FF"/>
+                </a:solidFill>
+              </a:rPr>
+              <a:t>Q</a:t>
+            </a:r>
+            <a:r>
+              <a:rPr lang="en-US" sz="4400" dirty="0"/>
+              <a:t>:</a:t>
+            </a:r>
+          </a:p>
+          <a:p>
+            <a:r>
+              <a:rPr lang="en-US" sz="4400" dirty="0" smtClean="0">
+                <a:solidFill>
+                  <a:srgbClr val="008000"/>
+                </a:solidFill>
+              </a:rPr>
+              <a:t>  it </a:t>
+            </a:r>
+            <a:r>
+              <a:rPr lang="en-US" sz="4400" dirty="0">
+                <a:solidFill>
+                  <a:srgbClr val="008000"/>
+                </a:solidFill>
+              </a:rPr>
+              <a:t>is impossible to write a </a:t>
+            </a:r>
+            <a:endParaRPr lang="en-US" sz="4400" dirty="0" smtClean="0">
+              <a:solidFill>
+                <a:srgbClr val="008000"/>
+              </a:solidFill>
+            </a:endParaRPr>
+          </a:p>
+          <a:p>
+            <a:r>
+              <a:rPr lang="en-US" sz="4400" dirty="0" smtClean="0">
+                <a:solidFill>
+                  <a:srgbClr val="008000"/>
+                </a:solidFill>
+              </a:rPr>
+              <a:t>  procedure that decides </a:t>
+            </a:r>
+          </a:p>
+          <a:p>
+            <a:r>
+              <a:rPr lang="en-US" sz="4400" dirty="0" smtClean="0">
+                <a:solidFill>
+                  <a:srgbClr val="008000"/>
+                </a:solidFill>
+              </a:rPr>
+              <a:t>  whether </a:t>
+            </a:r>
+            <a:r>
+              <a:rPr lang="en-US" sz="4400">
+                <a:solidFill>
+                  <a:srgbClr val="008000"/>
+                </a:solidFill>
+              </a:rPr>
+              <a:t>strings</a:t>
+            </a:r>
+            <a:r>
+              <a:rPr lang="en-US" sz="4400"/>
+              <a:t> </a:t>
+            </a:r>
+            <a:r>
+              <a:rPr lang="en-US" sz="4400" smtClean="0">
+                <a:solidFill>
+                  <a:srgbClr val="F50802"/>
+                </a:solidFill>
+              </a:rPr>
+              <a:t>HALT</a:t>
+            </a:r>
+            <a:endParaRPr lang="en-US" sz="4400" dirty="0">
+              <a:solidFill>
+                <a:srgbClr val="F50802"/>
+              </a:solidFill>
+            </a:endParaRPr>
+          </a:p>
+          <a:p>
+            <a:endParaRPr lang="en-US" sz="4400" dirty="0">
+              <a:solidFill>
+                <a:srgbClr val="F50802"/>
+              </a:solidFill>
+            </a:endParaRPr>
+          </a:p>
+        </p:txBody>
+      </p:sp>
+    </p:spTree>
+    <p:extLst>
+      <p:ext uri="{BB962C8B-B14F-4D97-AF65-F5344CB8AC3E}">
+        <p14:creationId xmlns:p14="http://schemas.microsoft.com/office/powerpoint/2010/main" val="510766806"/>
+      </p:ext>
+    </p:extLst>
+  </p:cSld>
+  <p:clrMapOvr>
+    <a:masterClrMapping/>
+  </p:clrMapOvr>
+  <p:transition xmlns:p14="http://schemas.microsoft.com/office/powerpoint/2010/main" spd="slow">
+    <p:fade/>
+  </p:transition>
+  <p:timing>
+    <p:tnLst>
+      <p:par>
+        <p:cTn xmlns:p14="http://schemas.microsoft.com/office/powerpoint/2010/main" id="1" dur="indefinite" restart="never" nodeType="tmRoot">
+          <p:childTnLst>
+            <p:seq concurrent="1" nextAc="seek">
+              <p:cTn id="2" dur="indefinite" nodeType="mainSeq">
+                <p:childTnLst>
+                  <p:par>
+                    <p:cTn id="3" fill="hold">
+                      <p:stCondLst>
+                        <p:cond delay="indefinite"/>
+                      </p:stCondLst>
+                      <p:childTnLst>
+                        <p:par>
+                          <p:cTn id="4" fill="hold">
+                            <p:stCondLst>
+                              <p:cond delay="0"/>
+                            </p:stCondLst>
+                            <p:childTnLst>
+                              <p:par>
+                                <p:cTn id="5" presetID="9" presetClass="entr" presetSubtype="0" fill="hold" nodeType="clickEffect">
+                                  <p:stCondLst>
+                                    <p:cond delay="0"/>
+                                  </p:stCondLst>
+                                  <p:childTnLst>
+                                    <p:set>
+                                      <p:cBhvr>
+                                        <p:cTn id="6" dur="1" fill="hold">
+                                          <p:stCondLst>
+                                            <p:cond delay="0"/>
+                                          </p:stCondLst>
+                                        </p:cTn>
+                                        <p:tgtEl>
+                                          <p:spTgt spid="3">
+                                            <p:txEl>
+                                              <p:pRg st="1" end="1"/>
+                                            </p:txEl>
+                                          </p:spTgt>
+                                        </p:tgtEl>
+                                        <p:attrNameLst>
+                                          <p:attrName>style.visibility</p:attrName>
+                                        </p:attrNameLst>
+                                      </p:cBhvr>
+                                      <p:to>
+                                        <p:strVal val="visible"/>
+                                      </p:to>
+                                    </p:set>
+                                    <p:animEffect transition="in" filter="dissolve">
+                                      <p:cBhvr>
+                                        <p:cTn id="7" dur="500"/>
+                                        <p:tgtEl>
+                                          <p:spTgt spid="3">
+                                            <p:txEl>
+                                              <p:pRg st="1" end="1"/>
+                                            </p:txEl>
+                                          </p:spTgt>
+                                        </p:tgtEl>
+                                      </p:cBhvr>
+                                    </p:animEffect>
+                                  </p:childTnLst>
+                                </p:cTn>
+                              </p:par>
+                            </p:childTnLst>
+                          </p:cTn>
+                        </p:par>
+                      </p:childTnLst>
+                    </p:cTn>
+                  </p:par>
+                  <p:par>
+                    <p:cTn id="8" fill="hold">
+                      <p:stCondLst>
+                        <p:cond delay="indefinite"/>
+                      </p:stCondLst>
+                      <p:childTnLst>
+                        <p:par>
+                          <p:cTn id="9" fill="hold">
+                            <p:stCondLst>
+                              <p:cond delay="0"/>
+                            </p:stCondLst>
+                            <p:childTnLst>
+                              <p:par>
+                                <p:cTn id="10" presetID="9" presetClass="entr" presetSubtype="0" fill="hold" nodeType="clickEffect">
+                                  <p:stCondLst>
+                                    <p:cond delay="0"/>
+                                  </p:stCondLst>
+                                  <p:childTnLst>
+                                    <p:set>
+                                      <p:cBhvr>
+                                        <p:cTn id="11" dur="1" fill="hold">
+                                          <p:stCondLst>
+                                            <p:cond delay="0"/>
+                                          </p:stCondLst>
+                                        </p:cTn>
+                                        <p:tgtEl>
+                                          <p:spTgt spid="3">
+                                            <p:txEl>
+                                              <p:pRg st="2" end="2"/>
+                                            </p:txEl>
+                                          </p:spTgt>
+                                        </p:tgtEl>
+                                        <p:attrNameLst>
+                                          <p:attrName>style.visibility</p:attrName>
+                                        </p:attrNameLst>
+                                      </p:cBhvr>
+                                      <p:to>
+                                        <p:strVal val="visible"/>
+                                      </p:to>
+                                    </p:set>
+                                    <p:animEffect transition="in" filter="dissolve">
+                                      <p:cBhvr>
+                                        <p:cTn id="12" dur="500"/>
+                                        <p:tgtEl>
+                                          <p:spTgt spid="3">
+                                            <p:txEl>
+                                              <p:pRg st="2" end="2"/>
+                                            </p:txEl>
+                                          </p:spTgt>
+                                        </p:tgtEl>
+                                      </p:cBhvr>
+                                    </p:animEffect>
+                                  </p:childTnLst>
+                                </p:cTn>
+                              </p:par>
+                            </p:childTnLst>
+                          </p:cTn>
+                        </p:par>
+                      </p:childTnLst>
+                    </p:cTn>
+                  </p:par>
+                  <p:par>
+                    <p:cTn id="13" fill="hold">
+                      <p:stCondLst>
+                        <p:cond delay="indefinite"/>
+                      </p:stCondLst>
+                      <p:childTnLst>
+                        <p:par>
+                          <p:cTn id="14" fill="hold">
+                            <p:stCondLst>
+                              <p:cond delay="0"/>
+                            </p:stCondLst>
+                            <p:childTnLst>
+                              <p:par>
+                                <p:cTn id="15" presetID="9" presetClass="entr" presetSubtype="0" fill="hold" nodeType="clickEffect">
+                                  <p:stCondLst>
+                                    <p:cond delay="0"/>
+                                  </p:stCondLst>
+                                  <p:childTnLst>
+                                    <p:set>
+                                      <p:cBhvr>
+                                        <p:cTn id="16" dur="1" fill="hold">
+                                          <p:stCondLst>
+                                            <p:cond delay="0"/>
+                                          </p:stCondLst>
+                                        </p:cTn>
+                                        <p:tgtEl>
+                                          <p:spTgt spid="3">
+                                            <p:txEl>
+                                              <p:pRg st="3" end="3"/>
+                                            </p:txEl>
+                                          </p:spTgt>
+                                        </p:tgtEl>
+                                        <p:attrNameLst>
+                                          <p:attrName>style.visibility</p:attrName>
+                                        </p:attrNameLst>
+                                      </p:cBhvr>
+                                      <p:to>
+                                        <p:strVal val="visible"/>
+                                      </p:to>
+                                    </p:set>
+                                    <p:animEffect transition="in" filter="dissolve">
+                                      <p:cBhvr>
+                                        <p:cTn id="17" dur="500"/>
+                                        <p:tgtEl>
+                                          <p:spTgt spid="3">
+                                            <p:txEl>
+                                              <p:pRg st="3" end="3"/>
+                                            </p:txEl>
+                                          </p:spTgt>
+                                        </p:tgtEl>
+                                      </p:cBhvr>
+                                    </p:animEffect>
+                                  </p:childTnLst>
+                                </p:cTn>
+                              </p:par>
+                              <p:par>
+                                <p:cTn id="18" presetID="9" presetClass="entr" presetSubtype="0" fill="hold" nodeType="withEffect">
+                                  <p:stCondLst>
+                                    <p:cond delay="0"/>
+                                  </p:stCondLst>
+                                  <p:childTnLst>
+                                    <p:set>
+                                      <p:cBhvr>
+                                        <p:cTn id="19" dur="1" fill="hold">
+                                          <p:stCondLst>
+                                            <p:cond delay="0"/>
+                                          </p:stCondLst>
+                                        </p:cTn>
+                                        <p:tgtEl>
+                                          <p:spTgt spid="3">
+                                            <p:txEl>
+                                              <p:pRg st="4" end="4"/>
+                                            </p:txEl>
+                                          </p:spTgt>
+                                        </p:tgtEl>
+                                        <p:attrNameLst>
+                                          <p:attrName>style.visibility</p:attrName>
+                                        </p:attrNameLst>
+                                      </p:cBhvr>
+                                      <p:to>
+                                        <p:strVal val="visible"/>
+                                      </p:to>
+                                    </p:set>
+                                    <p:animEffect transition="in" filter="dissolve">
+                                      <p:cBhvr>
+                                        <p:cTn id="20" dur="500"/>
+                                        <p:tgtEl>
+                                          <p:spTgt spid="3">
+                                            <p:txEl>
+                                              <p:pRg st="4" end="4"/>
+                                            </p:txEl>
+                                          </p:spTgt>
+                                        </p:tgtEl>
+                                      </p:cBhvr>
+                                    </p:animEffect>
+                                  </p:childTnLst>
+                                </p:cTn>
+                              </p:par>
+                              <p:par>
+                                <p:cTn id="21" presetID="9" presetClass="entr" presetSubtype="0" fill="hold" nodeType="withEffect">
+                                  <p:stCondLst>
+                                    <p:cond delay="0"/>
+                                  </p:stCondLst>
+                                  <p:childTnLst>
+                                    <p:set>
+                                      <p:cBhvr>
+                                        <p:cTn id="22" dur="1" fill="hold">
+                                          <p:stCondLst>
+                                            <p:cond delay="0"/>
+                                          </p:stCondLst>
+                                        </p:cTn>
+                                        <p:tgtEl>
+                                          <p:spTgt spid="3">
+                                            <p:txEl>
+                                              <p:pRg st="5" end="5"/>
+                                            </p:txEl>
+                                          </p:spTgt>
+                                        </p:tgtEl>
+                                        <p:attrNameLst>
+                                          <p:attrName>style.visibility</p:attrName>
+                                        </p:attrNameLst>
+                                      </p:cBhvr>
+                                      <p:to>
+                                        <p:strVal val="visible"/>
+                                      </p:to>
+                                    </p:set>
+                                    <p:animEffect transition="in" filter="dissolve">
+                                      <p:cBhvr>
+                                        <p:cTn id="23" dur="500"/>
+                                        <p:tgtEl>
+                                          <p:spTgt spid="3">
+                                            <p:txEl>
+                                              <p:pRg st="5" end="5"/>
+                                            </p:txEl>
+                                          </p:spTgt>
+                                        </p:tgtEl>
+                                      </p:cBhvr>
+                                    </p:animEffect>
+                                  </p:childTnLst>
+                                </p:cTn>
+                              </p:par>
+                            </p:childTnLst>
+                          </p:cTn>
+                        </p:par>
+                      </p:childTnLst>
+                    </p:cTn>
+                  </p:par>
+                </p:childTnLst>
+              </p:cTn>
+              <p:prevCondLst>
+                <p:cond evt="onPrev" delay="0">
+                  <p:tgtEl>
+                    <p:sldTgt/>
+                  </p:tgtEl>
+                </p:cond>
+              </p:prevCondLst>
+              <p:nextCondLst>
+                <p:cond evt="onNext" delay="0">
+                  <p:tgtEl>
+                    <p:sldTgt/>
+                  </p:tgtEl>
+                </p:cond>
+              </p:nextCondLst>
+            </p:seq>
+          </p:childTnLst>
+        </p:cTn>
+      </p:par>
+    </p:tnLst>
+  </p:timing>
+</p:sld>
+</file>
+
 <file path=ppt/slides/slide2.xml><?xml version="1.0" encoding="utf-8"?>
 <p:sld xmlns:a="http://schemas.openxmlformats.org/drawingml/2006/main" xmlns:r="http://schemas.openxmlformats.org/officeDocument/2006/relationships" xmlns:p="http://schemas.openxmlformats.org/presentationml/2006/main">
   <p:cSld>
@@ -5906,25 +7016,166 @@
             <p:ph idx="1"/>
           </p:nvPr>
         </p:nvSpPr>
-        <p:spPr/>
+        <p:spPr>
+          <a:xfrm>
+            <a:off x="458788" y="1523815"/>
+            <a:ext cx="8229600" cy="4525963"/>
+          </a:xfrm>
+        </p:spPr>
         <p:txBody>
           <a:bodyPr/>
           <a:lstStyle/>
           <a:p>
-            <a:pPr algn="ctr"/>
-            <a:r>
-              <a:rPr lang="en-US" sz="23900" dirty="0" smtClean="0">
-                <a:solidFill>
-                  <a:srgbClr val="F74BE3"/>
-                </a:solidFill>
-              </a:rPr>
-              <a:t>TBA</a:t>
-            </a:r>
-            <a:endParaRPr lang="en-US" sz="23900" dirty="0">
-              <a:solidFill>
-                <a:srgbClr val="F74BE3"/>
-              </a:solidFill>
-            </a:endParaRPr>
+            <a:r>
+              <a:rPr lang="en-US" dirty="0" smtClean="0"/>
+              <a:t>String </a:t>
+            </a:r>
+            <a:r>
+              <a:rPr lang="en-US" dirty="0"/>
+              <a:t>procedure </a:t>
+            </a:r>
+            <a:r>
+              <a:rPr lang="en-US" dirty="0" smtClean="0">
+                <a:solidFill>
+                  <a:srgbClr val="9933FF"/>
+                </a:solidFill>
+              </a:rPr>
+              <a:t>P</a:t>
+            </a:r>
+            <a:r>
+              <a:rPr lang="en-US" dirty="0" smtClean="0"/>
+              <a:t> </a:t>
+            </a:r>
+            <a:r>
+              <a:rPr lang="en-US" dirty="0"/>
+              <a:t>takes a String </a:t>
+            </a:r>
+            <a:endParaRPr lang="en-US" dirty="0" smtClean="0"/>
+          </a:p>
+          <a:p>
+            <a:r>
+              <a:rPr lang="en-US" dirty="0" smtClean="0"/>
+              <a:t>argument</a:t>
+            </a:r>
+            <a:r>
+              <a:rPr lang="en-US" dirty="0"/>
+              <a:t>:</a:t>
+            </a:r>
+          </a:p>
+          <a:p>
+            <a:r>
+              <a:rPr lang="en-US" dirty="0">
+                <a:solidFill>
+                  <a:srgbClr val="9933FF"/>
+                </a:solidFill>
+              </a:rPr>
+              <a:t>P</a:t>
+            </a:r>
+            <a:r>
+              <a:rPr lang="en-US" dirty="0"/>
+              <a:t>("</a:t>
+            </a:r>
+            <a:r>
+              <a:rPr lang="en-US" dirty="0">
+                <a:solidFill>
+                  <a:srgbClr val="0000FF"/>
+                </a:solidFill>
+              </a:rPr>
+              <a:t>no</a:t>
+            </a:r>
+            <a:r>
+              <a:rPr lang="en-US" dirty="0"/>
+              <a:t>") returns 2</a:t>
+            </a:r>
+          </a:p>
+          <a:p>
+            <a:r>
+              <a:rPr lang="en-US" dirty="0">
+                <a:solidFill>
+                  <a:srgbClr val="9933FF"/>
+                </a:solidFill>
+              </a:rPr>
+              <a:t>P</a:t>
+            </a:r>
+            <a:r>
+              <a:rPr lang="en-US" dirty="0"/>
+              <a:t>("</a:t>
+            </a:r>
+            <a:r>
+              <a:rPr lang="en-US" dirty="0">
+                <a:solidFill>
+                  <a:srgbClr val="0000FF"/>
+                </a:solidFill>
+              </a:rPr>
+              <a:t>albert</a:t>
+            </a:r>
+            <a:r>
+              <a:rPr lang="en-US" dirty="0"/>
+              <a:t>") returns "</a:t>
+            </a:r>
+            <a:r>
+              <a:rPr lang="en-US" dirty="0" err="1"/>
+              <a:t>meyer</a:t>
+            </a:r>
+            <a:r>
+              <a:rPr lang="en-US" dirty="0"/>
+              <a:t>"</a:t>
+            </a:r>
+          </a:p>
+          <a:p>
+            <a:r>
+              <a:rPr lang="en-US" dirty="0">
+                <a:solidFill>
+                  <a:srgbClr val="9933FF"/>
+                </a:solidFill>
+              </a:rPr>
+              <a:t>P</a:t>
+            </a:r>
+            <a:r>
+              <a:rPr lang="en-US" dirty="0"/>
+              <a:t>("</a:t>
+            </a:r>
+            <a:r>
+              <a:rPr lang="en-US" dirty="0">
+                <a:solidFill>
+                  <a:srgbClr val="0000FF"/>
+                </a:solidFill>
+              </a:rPr>
+              <a:t>&amp;&amp;%99!!</a:t>
+            </a:r>
+            <a:r>
+              <a:rPr lang="en-US" dirty="0"/>
+              <a:t>") causes an error</a:t>
+            </a:r>
+          </a:p>
+          <a:p>
+            <a:r>
+              <a:rPr lang="en-US" dirty="0">
+                <a:solidFill>
+                  <a:srgbClr val="9933FF"/>
+                </a:solidFill>
+              </a:rPr>
+              <a:t>P</a:t>
+            </a:r>
+            <a:r>
+              <a:rPr lang="en-US" dirty="0"/>
+              <a:t>("</a:t>
+            </a:r>
+            <a:r>
+              <a:rPr lang="en-US" dirty="0">
+                <a:solidFill>
+                  <a:srgbClr val="0000FF"/>
+                </a:solidFill>
+              </a:rPr>
+              <a:t>what now?</a:t>
+            </a:r>
+            <a:r>
+              <a:rPr lang="en-US" dirty="0"/>
+              <a:t>") runs forever.</a:t>
+            </a:r>
+          </a:p>
+          <a:p>
+            <a:endParaRPr lang="en-US" dirty="0"/>
           </a:p>
         </p:txBody>
       </p:sp>
@@ -5938,18 +7189,1663 @@
   <p:clrMapOvr>
     <a:masterClrMapping/>
   </p:clrMapOvr>
-  <mc:AlternateContent xmlns:mc="http://schemas.openxmlformats.org/markup-compatibility/2006" xmlns:p14="http://schemas.microsoft.com/office/powerpoint/2010/main">
-    <mc:Choice Requires="p14">
-      <p:transition spd="slow" p14:dur="2000"/>
+  <mc:AlternateContent xmlns:mc="http://schemas.openxmlformats.org/markup-compatibility/2006">
+    <mc:Choice xmlns:p14="http://schemas.microsoft.com/office/powerpoint/2010/main" Requires="p14">
+      <p:transition spd="slow" p14:dur="1200">
+        <p:fade thruBlk="1"/>
+      </p:transition>
     </mc:Choice>
-    <mc:Fallback xmlns="">
-      <p:transition xmlns:p14="http://schemas.microsoft.com/office/powerpoint/2010/main" spd="slow"/>
+    <mc:Fallback>
+      <p:transition xmlns:p14="http://schemas.microsoft.com/office/powerpoint/2010/main" spd="slow">
+        <p:fade thruBlk="1"/>
+      </p:transition>
     </mc:Fallback>
   </mc:AlternateContent>
   <p:timing>
     <p:tnLst>
       <p:par>
-        <p:cTn xmlns:p14="http://schemas.microsoft.com/office/powerpoint/2010/main" id="1" dur="indefinite" restart="never" nodeType="tmRoot"/>
+        <p:cTn xmlns:p14="http://schemas.microsoft.com/office/powerpoint/2010/main" id="1" dur="indefinite" restart="never" nodeType="tmRoot">
+          <p:childTnLst>
+            <p:seq concurrent="1" nextAc="seek">
+              <p:cTn id="2" dur="indefinite" nodeType="mainSeq">
+                <p:childTnLst>
+                  <p:par>
+                    <p:cTn id="3" fill="hold">
+                      <p:stCondLst>
+                        <p:cond delay="indefinite"/>
+                      </p:stCondLst>
+                      <p:childTnLst>
+                        <p:par>
+                          <p:cTn id="4" fill="hold">
+                            <p:stCondLst>
+                              <p:cond delay="0"/>
+                            </p:stCondLst>
+                            <p:childTnLst>
+                              <p:par>
+                                <p:cTn id="5" presetID="9" presetClass="entr" presetSubtype="0" fill="hold" nodeType="clickEffect">
+                                  <p:stCondLst>
+                                    <p:cond delay="0"/>
+                                  </p:stCondLst>
+                                  <p:childTnLst>
+                                    <p:set>
+                                      <p:cBhvr>
+                                        <p:cTn id="6" dur="1" fill="hold">
+                                          <p:stCondLst>
+                                            <p:cond delay="0"/>
+                                          </p:stCondLst>
+                                        </p:cTn>
+                                        <p:tgtEl>
+                                          <p:spTgt spid="3">
+                                            <p:txEl>
+                                              <p:pRg st="2" end="2"/>
+                                            </p:txEl>
+                                          </p:spTgt>
+                                        </p:tgtEl>
+                                        <p:attrNameLst>
+                                          <p:attrName>style.visibility</p:attrName>
+                                        </p:attrNameLst>
+                                      </p:cBhvr>
+                                      <p:to>
+                                        <p:strVal val="visible"/>
+                                      </p:to>
+                                    </p:set>
+                                    <p:animEffect transition="in" filter="dissolve">
+                                      <p:cBhvr>
+                                        <p:cTn id="7" dur="500"/>
+                                        <p:tgtEl>
+                                          <p:spTgt spid="3">
+                                            <p:txEl>
+                                              <p:pRg st="2" end="2"/>
+                                            </p:txEl>
+                                          </p:spTgt>
+                                        </p:tgtEl>
+                                      </p:cBhvr>
+                                    </p:animEffect>
+                                  </p:childTnLst>
+                                </p:cTn>
+                              </p:par>
+                            </p:childTnLst>
+                          </p:cTn>
+                        </p:par>
+                      </p:childTnLst>
+                    </p:cTn>
+                  </p:par>
+                  <p:par>
+                    <p:cTn id="8" fill="hold">
+                      <p:stCondLst>
+                        <p:cond delay="indefinite"/>
+                      </p:stCondLst>
+                      <p:childTnLst>
+                        <p:par>
+                          <p:cTn id="9" fill="hold">
+                            <p:stCondLst>
+                              <p:cond delay="0"/>
+                            </p:stCondLst>
+                            <p:childTnLst>
+                              <p:par>
+                                <p:cTn id="10" presetID="9" presetClass="entr" presetSubtype="0" fill="hold" nodeType="clickEffect">
+                                  <p:stCondLst>
+                                    <p:cond delay="0"/>
+                                  </p:stCondLst>
+                                  <p:childTnLst>
+                                    <p:set>
+                                      <p:cBhvr>
+                                        <p:cTn id="11" dur="1" fill="hold">
+                                          <p:stCondLst>
+                                            <p:cond delay="0"/>
+                                          </p:stCondLst>
+                                        </p:cTn>
+                                        <p:tgtEl>
+                                          <p:spTgt spid="3">
+                                            <p:txEl>
+                                              <p:pRg st="3" end="3"/>
+                                            </p:txEl>
+                                          </p:spTgt>
+                                        </p:tgtEl>
+                                        <p:attrNameLst>
+                                          <p:attrName>style.visibility</p:attrName>
+                                        </p:attrNameLst>
+                                      </p:cBhvr>
+                                      <p:to>
+                                        <p:strVal val="visible"/>
+                                      </p:to>
+                                    </p:set>
+                                    <p:animEffect transition="in" filter="dissolve">
+                                      <p:cBhvr>
+                                        <p:cTn id="12" dur="500"/>
+                                        <p:tgtEl>
+                                          <p:spTgt spid="3">
+                                            <p:txEl>
+                                              <p:pRg st="3" end="3"/>
+                                            </p:txEl>
+                                          </p:spTgt>
+                                        </p:tgtEl>
+                                      </p:cBhvr>
+                                    </p:animEffect>
+                                  </p:childTnLst>
+                                </p:cTn>
+                              </p:par>
+                            </p:childTnLst>
+                          </p:cTn>
+                        </p:par>
+                      </p:childTnLst>
+                    </p:cTn>
+                  </p:par>
+                  <p:par>
+                    <p:cTn id="13" fill="hold">
+                      <p:stCondLst>
+                        <p:cond delay="indefinite"/>
+                      </p:stCondLst>
+                      <p:childTnLst>
+                        <p:par>
+                          <p:cTn id="14" fill="hold">
+                            <p:stCondLst>
+                              <p:cond delay="0"/>
+                            </p:stCondLst>
+                            <p:childTnLst>
+                              <p:par>
+                                <p:cTn id="15" presetID="9" presetClass="entr" presetSubtype="0" fill="hold" nodeType="clickEffect">
+                                  <p:stCondLst>
+                                    <p:cond delay="0"/>
+                                  </p:stCondLst>
+                                  <p:childTnLst>
+                                    <p:set>
+                                      <p:cBhvr>
+                                        <p:cTn id="16" dur="1" fill="hold">
+                                          <p:stCondLst>
+                                            <p:cond delay="0"/>
+                                          </p:stCondLst>
+                                        </p:cTn>
+                                        <p:tgtEl>
+                                          <p:spTgt spid="3">
+                                            <p:txEl>
+                                              <p:pRg st="4" end="4"/>
+                                            </p:txEl>
+                                          </p:spTgt>
+                                        </p:tgtEl>
+                                        <p:attrNameLst>
+                                          <p:attrName>style.visibility</p:attrName>
+                                        </p:attrNameLst>
+                                      </p:cBhvr>
+                                      <p:to>
+                                        <p:strVal val="visible"/>
+                                      </p:to>
+                                    </p:set>
+                                    <p:animEffect transition="in" filter="dissolve">
+                                      <p:cBhvr>
+                                        <p:cTn id="17" dur="500"/>
+                                        <p:tgtEl>
+                                          <p:spTgt spid="3">
+                                            <p:txEl>
+                                              <p:pRg st="4" end="4"/>
+                                            </p:txEl>
+                                          </p:spTgt>
+                                        </p:tgtEl>
+                                      </p:cBhvr>
+                                    </p:animEffect>
+                                  </p:childTnLst>
+                                </p:cTn>
+                              </p:par>
+                            </p:childTnLst>
+                          </p:cTn>
+                        </p:par>
+                      </p:childTnLst>
+                    </p:cTn>
+                  </p:par>
+                  <p:par>
+                    <p:cTn id="18" fill="hold">
+                      <p:stCondLst>
+                        <p:cond delay="indefinite"/>
+                      </p:stCondLst>
+                      <p:childTnLst>
+                        <p:par>
+                          <p:cTn id="19" fill="hold">
+                            <p:stCondLst>
+                              <p:cond delay="0"/>
+                            </p:stCondLst>
+                            <p:childTnLst>
+                              <p:par>
+                                <p:cTn id="20" presetID="9" presetClass="entr" presetSubtype="0" fill="hold" nodeType="clickEffect">
+                                  <p:stCondLst>
+                                    <p:cond delay="0"/>
+                                  </p:stCondLst>
+                                  <p:childTnLst>
+                                    <p:set>
+                                      <p:cBhvr>
+                                        <p:cTn id="21" dur="1" fill="hold">
+                                          <p:stCondLst>
+                                            <p:cond delay="0"/>
+                                          </p:stCondLst>
+                                        </p:cTn>
+                                        <p:tgtEl>
+                                          <p:spTgt spid="3">
+                                            <p:txEl>
+                                              <p:pRg st="5" end="5"/>
+                                            </p:txEl>
+                                          </p:spTgt>
+                                        </p:tgtEl>
+                                        <p:attrNameLst>
+                                          <p:attrName>style.visibility</p:attrName>
+                                        </p:attrNameLst>
+                                      </p:cBhvr>
+                                      <p:to>
+                                        <p:strVal val="visible"/>
+                                      </p:to>
+                                    </p:set>
+                                    <p:animEffect transition="in" filter="dissolve">
+                                      <p:cBhvr>
+                                        <p:cTn id="22" dur="500"/>
+                                        <p:tgtEl>
+                                          <p:spTgt spid="3">
+                                            <p:txEl>
+                                              <p:pRg st="5" end="5"/>
+                                            </p:txEl>
+                                          </p:spTgt>
+                                        </p:tgtEl>
+                                      </p:cBhvr>
+                                    </p:animEffect>
+                                  </p:childTnLst>
+                                </p:cTn>
+                              </p:par>
+                            </p:childTnLst>
+                          </p:cTn>
+                        </p:par>
+                      </p:childTnLst>
+                    </p:cTn>
+                  </p:par>
+                </p:childTnLst>
+              </p:cTn>
+              <p:prevCondLst>
+                <p:cond evt="onPrev" delay="0">
+                  <p:tgtEl>
+                    <p:sldTgt/>
+                  </p:tgtEl>
+                </p:cond>
+              </p:prevCondLst>
+              <p:nextCondLst>
+                <p:cond evt="onNext" delay="0">
+                  <p:tgtEl>
+                    <p:sldTgt/>
+                  </p:tgtEl>
+                </p:cond>
+              </p:nextCondLst>
+            </p:seq>
+          </p:childTnLst>
+        </p:cTn>
+      </p:par>
+    </p:tnLst>
+  </p:timing>
+</p:sld>
+</file>
+
+<file path=ppt/slides/slide6.xml><?xml version="1.0" encoding="utf-8"?>
+<p:sld xmlns:a="http://schemas.openxmlformats.org/drawingml/2006/main" xmlns:r="http://schemas.openxmlformats.org/officeDocument/2006/relationships" xmlns:p="http://schemas.openxmlformats.org/presentationml/2006/main">
+  <p:cSld>
+    <p:spTree>
+      <p:nvGrpSpPr>
+        <p:cNvPr id="1" name=""/>
+        <p:cNvGrpSpPr/>
+        <p:nvPr/>
+      </p:nvGrpSpPr>
+      <p:grpSpPr>
+        <a:xfrm>
+          <a:off x="0" y="0"/>
+          <a:ext cx="0" cy="0"/>
+          <a:chOff x="0" y="0"/>
+          <a:chExt cx="0" cy="0"/>
+        </a:xfrm>
+      </p:grpSpPr>
+      <p:sp>
+        <p:nvSpPr>
+          <p:cNvPr id="2" name="Title 1"/>
+          <p:cNvSpPr>
+            <a:spLocks noGrp="1"/>
+          </p:cNvSpPr>
+          <p:nvPr>
+            <p:ph type="title"/>
+          </p:nvPr>
+        </p:nvSpPr>
+        <p:spPr/>
+        <p:txBody>
+          <a:bodyPr/>
+          <a:lstStyle/>
+          <a:p>
+            <a:r>
+              <a:rPr lang="en-US" dirty="0" smtClean="0"/>
+              <a:t>The Halting Problem</a:t>
+            </a:r>
+            <a:endParaRPr lang="en-US" dirty="0"/>
+          </a:p>
+        </p:txBody>
+      </p:sp>
+      <p:sp>
+        <p:nvSpPr>
+          <p:cNvPr id="3" name="Content Placeholder 2"/>
+          <p:cNvSpPr>
+            <a:spLocks noGrp="1"/>
+          </p:cNvSpPr>
+          <p:nvPr>
+            <p:ph idx="1"/>
+          </p:nvPr>
+        </p:nvSpPr>
+        <p:spPr>
+          <a:xfrm>
+            <a:off x="458788" y="1523815"/>
+            <a:ext cx="8229600" cy="4525963"/>
+          </a:xfrm>
+        </p:spPr>
+        <p:txBody>
+          <a:bodyPr/>
+          <a:lstStyle/>
+          <a:p>
+            <a:r>
+              <a:rPr lang="en-US" sz="4800" dirty="0" smtClean="0"/>
+              <a:t>Let </a:t>
+            </a:r>
+            <a:r>
+              <a:rPr lang="en-US" sz="4800" dirty="0">
+                <a:solidFill>
+                  <a:srgbClr val="0000FF"/>
+                </a:solidFill>
+              </a:rPr>
+              <a:t>s</a:t>
+            </a:r>
+            <a:r>
+              <a:rPr lang="en-US" sz="4800" dirty="0"/>
+              <a:t> be the text </a:t>
+            </a:r>
+            <a:r>
+              <a:rPr lang="en-US" sz="4800" dirty="0" smtClean="0"/>
+              <a:t>string</a:t>
+            </a:r>
+          </a:p>
+          <a:p>
+            <a:r>
+              <a:rPr lang="en-US" sz="4800" dirty="0" smtClean="0"/>
+              <a:t>from which </a:t>
+            </a:r>
+            <a:r>
+              <a:rPr lang="en-US" sz="4800" dirty="0">
+                <a:solidFill>
+                  <a:srgbClr val="9933FF"/>
+                </a:solidFill>
+              </a:rPr>
+              <a:t>P </a:t>
+            </a:r>
+            <a:r>
+              <a:rPr lang="en-US" sz="4800" dirty="0"/>
+              <a:t>was compiled.</a:t>
+            </a:r>
+          </a:p>
+          <a:p>
+            <a:r>
+              <a:rPr lang="en-US" sz="4800" dirty="0"/>
+              <a:t>Say </a:t>
+            </a:r>
+            <a:r>
+              <a:rPr lang="en-US" sz="4800" dirty="0">
+                <a:solidFill>
+                  <a:srgbClr val="0000FF"/>
+                </a:solidFill>
+              </a:rPr>
+              <a:t>s</a:t>
+            </a:r>
+            <a:r>
+              <a:rPr lang="en-US" sz="4800" dirty="0"/>
+              <a:t> </a:t>
+            </a:r>
+            <a:r>
+              <a:rPr lang="en-US" sz="4800" dirty="0">
+                <a:solidFill>
+                  <a:srgbClr val="F50802"/>
+                </a:solidFill>
+              </a:rPr>
+              <a:t>HALTS</a:t>
+            </a:r>
+            <a:r>
+              <a:rPr lang="en-US" sz="4800" dirty="0"/>
+              <a:t> if </a:t>
+            </a:r>
+            <a:r>
+              <a:rPr lang="en-US" sz="4800" dirty="0">
+                <a:solidFill>
+                  <a:srgbClr val="9933FF"/>
+                </a:solidFill>
+              </a:rPr>
+              <a:t>P</a:t>
+            </a:r>
+            <a:r>
+              <a:rPr lang="en-US" sz="4800" dirty="0"/>
+              <a:t>(</a:t>
+            </a:r>
+            <a:r>
+              <a:rPr lang="en-US" sz="4800" dirty="0">
+                <a:solidFill>
+                  <a:srgbClr val="0000FF"/>
+                </a:solidFill>
+              </a:rPr>
+              <a:t>s</a:t>
+            </a:r>
+            <a:r>
+              <a:rPr lang="en-US" sz="4800" dirty="0"/>
+              <a:t>) returns something.</a:t>
+            </a:r>
+          </a:p>
+        </p:txBody>
+      </p:sp>
+    </p:spTree>
+    <p:extLst>
+      <p:ext uri="{BB962C8B-B14F-4D97-AF65-F5344CB8AC3E}">
+        <p14:creationId xmlns:p14="http://schemas.microsoft.com/office/powerpoint/2010/main" val="874479442"/>
+      </p:ext>
+    </p:extLst>
+  </p:cSld>
+  <p:clrMapOvr>
+    <a:masterClrMapping/>
+  </p:clrMapOvr>
+  <p:transition xmlns:p14="http://schemas.microsoft.com/office/powerpoint/2010/main" spd="slow">
+    <p:fade/>
+  </p:transition>
+  <p:timing>
+    <p:tnLst>
+      <p:par>
+        <p:cTn xmlns:p14="http://schemas.microsoft.com/office/powerpoint/2010/main" id="1" dur="indefinite" restart="never" nodeType="tmRoot">
+          <p:childTnLst>
+            <p:seq concurrent="1" nextAc="seek">
+              <p:cTn id="2" dur="indefinite" nodeType="mainSeq">
+                <p:childTnLst>
+                  <p:par>
+                    <p:cTn id="3" fill="hold">
+                      <p:stCondLst>
+                        <p:cond delay="indefinite"/>
+                      </p:stCondLst>
+                      <p:childTnLst>
+                        <p:par>
+                          <p:cTn id="4" fill="hold">
+                            <p:stCondLst>
+                              <p:cond delay="0"/>
+                            </p:stCondLst>
+                            <p:childTnLst>
+                              <p:par>
+                                <p:cTn id="5" presetID="9" presetClass="entr" presetSubtype="0" fill="hold" nodeType="clickEffect">
+                                  <p:stCondLst>
+                                    <p:cond delay="0"/>
+                                  </p:stCondLst>
+                                  <p:childTnLst>
+                                    <p:set>
+                                      <p:cBhvr>
+                                        <p:cTn id="6" dur="1" fill="hold">
+                                          <p:stCondLst>
+                                            <p:cond delay="0"/>
+                                          </p:stCondLst>
+                                        </p:cTn>
+                                        <p:tgtEl>
+                                          <p:spTgt spid="3">
+                                            <p:txEl>
+                                              <p:pRg st="2" end="2"/>
+                                            </p:txEl>
+                                          </p:spTgt>
+                                        </p:tgtEl>
+                                        <p:attrNameLst>
+                                          <p:attrName>style.visibility</p:attrName>
+                                        </p:attrNameLst>
+                                      </p:cBhvr>
+                                      <p:to>
+                                        <p:strVal val="visible"/>
+                                      </p:to>
+                                    </p:set>
+                                    <p:animEffect transition="in" filter="dissolve">
+                                      <p:cBhvr>
+                                        <p:cTn id="7" dur="500"/>
+                                        <p:tgtEl>
+                                          <p:spTgt spid="3">
+                                            <p:txEl>
+                                              <p:pRg st="2" end="2"/>
+                                            </p:txEl>
+                                          </p:spTgt>
+                                        </p:tgtEl>
+                                      </p:cBhvr>
+                                    </p:animEffect>
+                                  </p:childTnLst>
+                                </p:cTn>
+                              </p:par>
+                            </p:childTnLst>
+                          </p:cTn>
+                        </p:par>
+                      </p:childTnLst>
+                    </p:cTn>
+                  </p:par>
+                </p:childTnLst>
+              </p:cTn>
+              <p:prevCondLst>
+                <p:cond evt="onPrev" delay="0">
+                  <p:tgtEl>
+                    <p:sldTgt/>
+                  </p:tgtEl>
+                </p:cond>
+              </p:prevCondLst>
+              <p:nextCondLst>
+                <p:cond evt="onNext" delay="0">
+                  <p:tgtEl>
+                    <p:sldTgt/>
+                  </p:tgtEl>
+                </p:cond>
+              </p:nextCondLst>
+            </p:seq>
+          </p:childTnLst>
+        </p:cTn>
+      </p:par>
+    </p:tnLst>
+  </p:timing>
+</p:sld>
+</file>
+
+<file path=ppt/slides/slide7.xml><?xml version="1.0" encoding="utf-8"?>
+<p:sld xmlns:a="http://schemas.openxmlformats.org/drawingml/2006/main" xmlns:r="http://schemas.openxmlformats.org/officeDocument/2006/relationships" xmlns:p="http://schemas.openxmlformats.org/presentationml/2006/main">
+  <p:cSld>
+    <p:spTree>
+      <p:nvGrpSpPr>
+        <p:cNvPr id="1" name=""/>
+        <p:cNvGrpSpPr/>
+        <p:nvPr/>
+      </p:nvGrpSpPr>
+      <p:grpSpPr>
+        <a:xfrm>
+          <a:off x="0" y="0"/>
+          <a:ext cx="0" cy="0"/>
+          <a:chOff x="0" y="0"/>
+          <a:chExt cx="0" cy="0"/>
+        </a:xfrm>
+      </p:grpSpPr>
+      <p:sp>
+        <p:nvSpPr>
+          <p:cNvPr id="2" name="Title 1"/>
+          <p:cNvSpPr>
+            <a:spLocks noGrp="1"/>
+          </p:cNvSpPr>
+          <p:nvPr>
+            <p:ph type="title"/>
+          </p:nvPr>
+        </p:nvSpPr>
+        <p:spPr/>
+        <p:txBody>
+          <a:bodyPr/>
+          <a:lstStyle/>
+          <a:p>
+            <a:r>
+              <a:rPr lang="en-US" dirty="0" smtClean="0"/>
+              <a:t>The Halting Problem</a:t>
+            </a:r>
+            <a:endParaRPr lang="en-US" dirty="0"/>
+          </a:p>
+        </p:txBody>
+      </p:sp>
+      <p:sp>
+        <p:nvSpPr>
+          <p:cNvPr id="3" name="Content Placeholder 2"/>
+          <p:cNvSpPr>
+            <a:spLocks noGrp="1"/>
+          </p:cNvSpPr>
+          <p:nvPr>
+            <p:ph idx="1"/>
+          </p:nvPr>
+        </p:nvSpPr>
+        <p:spPr>
+          <a:xfrm>
+            <a:off x="0" y="1409235"/>
+            <a:ext cx="9061643" cy="5121739"/>
+          </a:xfrm>
+        </p:spPr>
+        <p:txBody>
+          <a:bodyPr/>
+          <a:lstStyle/>
+          <a:p>
+            <a:r>
+              <a:rPr lang="en-US" sz="4800" dirty="0"/>
+              <a:t>Suppose there was a </a:t>
+            </a:r>
+            <a:endParaRPr lang="en-US" sz="4800" dirty="0" smtClean="0"/>
+          </a:p>
+          <a:p>
+            <a:r>
+              <a:rPr lang="en-US" sz="4800" dirty="0" smtClean="0"/>
+              <a:t>procedure </a:t>
+            </a:r>
+            <a:r>
+              <a:rPr lang="en-US" sz="4800" dirty="0">
+                <a:solidFill>
+                  <a:srgbClr val="9933FF"/>
+                </a:solidFill>
+              </a:rPr>
+              <a:t>Q</a:t>
+            </a:r>
+            <a:r>
+              <a:rPr lang="en-US" sz="4800" dirty="0"/>
+              <a:t> that decided </a:t>
+            </a:r>
+            <a:endParaRPr lang="en-US" sz="4800" dirty="0" smtClean="0"/>
+          </a:p>
+          <a:p>
+            <a:r>
+              <a:rPr lang="en-US" sz="4800" dirty="0" smtClean="0">
+                <a:solidFill>
+                  <a:srgbClr val="F50802"/>
+                </a:solidFill>
+              </a:rPr>
+              <a:t>HALTS</a:t>
+            </a:r>
+            <a:r>
+              <a:rPr lang="en-US" sz="4800" dirty="0"/>
+              <a:t>:</a:t>
+            </a:r>
+          </a:p>
+          <a:p>
+            <a:r>
+              <a:rPr lang="en-US" sz="4800" dirty="0" smtClean="0">
+                <a:solidFill>
+                  <a:srgbClr val="9933FF"/>
+                </a:solidFill>
+              </a:rPr>
+              <a:t>Q</a:t>
+            </a:r>
+            <a:r>
+              <a:rPr lang="en-US" sz="4800" dirty="0"/>
+              <a:t>(</a:t>
+            </a:r>
+            <a:r>
+              <a:rPr lang="en-US" sz="4800" dirty="0">
+                <a:solidFill>
+                  <a:srgbClr val="0000FF"/>
+                </a:solidFill>
+              </a:rPr>
+              <a:t>s</a:t>
+            </a:r>
+            <a:r>
+              <a:rPr lang="en-US" sz="4800" dirty="0"/>
+              <a:t>) returns "</a:t>
+            </a:r>
+            <a:r>
+              <a:rPr lang="en-US" sz="4800" dirty="0" smtClean="0">
+                <a:solidFill>
+                  <a:srgbClr val="0000FF"/>
+                </a:solidFill>
+              </a:rPr>
+              <a:t>yes</a:t>
+            </a:r>
+            <a:r>
+              <a:rPr lang="en-US" sz="4800" dirty="0" smtClean="0"/>
+              <a:t>” if </a:t>
+            </a:r>
+            <a:r>
+              <a:rPr lang="en-US" sz="4800" dirty="0">
+                <a:solidFill>
+                  <a:srgbClr val="0000FF"/>
+                </a:solidFill>
+              </a:rPr>
+              <a:t>s </a:t>
+            </a:r>
+            <a:r>
+              <a:rPr lang="en-US" sz="4800" dirty="0">
+                <a:solidFill>
+                  <a:srgbClr val="F50802"/>
+                </a:solidFill>
+              </a:rPr>
+              <a:t>HALTS</a:t>
+            </a:r>
+          </a:p>
+          <a:p>
+            <a:r>
+              <a:rPr lang="en-US" sz="4800" dirty="0"/>
+              <a:t>       </a:t>
+            </a:r>
+            <a:r>
+              <a:rPr lang="en-US" sz="4800" dirty="0" smtClean="0"/>
+              <a:t> returns </a:t>
+            </a:r>
+            <a:r>
+              <a:rPr lang="en-US" sz="4800" dirty="0"/>
+              <a:t>"</a:t>
+            </a:r>
+            <a:r>
+              <a:rPr lang="en-US" sz="4800" dirty="0" smtClean="0">
+                <a:solidFill>
+                  <a:srgbClr val="0000FF"/>
+                </a:solidFill>
+              </a:rPr>
+              <a:t>no</a:t>
+            </a:r>
+            <a:r>
+              <a:rPr lang="en-US" sz="4800" dirty="0" smtClean="0"/>
+              <a:t>” otherwise</a:t>
+            </a:r>
+            <a:endParaRPr lang="en-US" sz="4800" dirty="0"/>
+          </a:p>
+        </p:txBody>
+      </p:sp>
+    </p:spTree>
+    <p:extLst>
+      <p:ext uri="{BB962C8B-B14F-4D97-AF65-F5344CB8AC3E}">
+        <p14:creationId xmlns:p14="http://schemas.microsoft.com/office/powerpoint/2010/main" val="388763576"/>
+      </p:ext>
+    </p:extLst>
+  </p:cSld>
+  <p:clrMapOvr>
+    <a:masterClrMapping/>
+  </p:clrMapOvr>
+  <p:transition xmlns:p14="http://schemas.microsoft.com/office/powerpoint/2010/main" spd="slow">
+    <p:fade/>
+  </p:transition>
+  <p:timing>
+    <p:tnLst>
+      <p:par>
+        <p:cTn xmlns:p14="http://schemas.microsoft.com/office/powerpoint/2010/main" id="1" dur="indefinite" restart="never" nodeType="tmRoot">
+          <p:childTnLst>
+            <p:seq concurrent="1" nextAc="seek">
+              <p:cTn id="2" dur="indefinite" nodeType="mainSeq">
+                <p:childTnLst>
+                  <p:par>
+                    <p:cTn id="3" fill="hold">
+                      <p:stCondLst>
+                        <p:cond delay="indefinite"/>
+                      </p:stCondLst>
+                      <p:childTnLst>
+                        <p:par>
+                          <p:cTn id="4" fill="hold">
+                            <p:stCondLst>
+                              <p:cond delay="0"/>
+                            </p:stCondLst>
+                            <p:childTnLst>
+                              <p:par>
+                                <p:cTn id="5" presetID="9" presetClass="entr" presetSubtype="0" fill="hold" nodeType="clickEffect">
+                                  <p:stCondLst>
+                                    <p:cond delay="0"/>
+                                  </p:stCondLst>
+                                  <p:childTnLst>
+                                    <p:set>
+                                      <p:cBhvr>
+                                        <p:cTn id="6" dur="1" fill="hold">
+                                          <p:stCondLst>
+                                            <p:cond delay="0"/>
+                                          </p:stCondLst>
+                                        </p:cTn>
+                                        <p:tgtEl>
+                                          <p:spTgt spid="3">
+                                            <p:txEl>
+                                              <p:pRg st="3" end="3"/>
+                                            </p:txEl>
+                                          </p:spTgt>
+                                        </p:tgtEl>
+                                        <p:attrNameLst>
+                                          <p:attrName>style.visibility</p:attrName>
+                                        </p:attrNameLst>
+                                      </p:cBhvr>
+                                      <p:to>
+                                        <p:strVal val="visible"/>
+                                      </p:to>
+                                    </p:set>
+                                    <p:animEffect transition="in" filter="dissolve">
+                                      <p:cBhvr>
+                                        <p:cTn id="7" dur="500"/>
+                                        <p:tgtEl>
+                                          <p:spTgt spid="3">
+                                            <p:txEl>
+                                              <p:pRg st="3" end="3"/>
+                                            </p:txEl>
+                                          </p:spTgt>
+                                        </p:tgtEl>
+                                      </p:cBhvr>
+                                    </p:animEffect>
+                                  </p:childTnLst>
+                                </p:cTn>
+                              </p:par>
+                            </p:childTnLst>
+                          </p:cTn>
+                        </p:par>
+                      </p:childTnLst>
+                    </p:cTn>
+                  </p:par>
+                  <p:par>
+                    <p:cTn id="8" fill="hold">
+                      <p:stCondLst>
+                        <p:cond delay="indefinite"/>
+                      </p:stCondLst>
+                      <p:childTnLst>
+                        <p:par>
+                          <p:cTn id="9" fill="hold">
+                            <p:stCondLst>
+                              <p:cond delay="0"/>
+                            </p:stCondLst>
+                            <p:childTnLst>
+                              <p:par>
+                                <p:cTn id="10" presetID="9" presetClass="entr" presetSubtype="0" fill="hold" nodeType="clickEffect">
+                                  <p:stCondLst>
+                                    <p:cond delay="0"/>
+                                  </p:stCondLst>
+                                  <p:childTnLst>
+                                    <p:set>
+                                      <p:cBhvr>
+                                        <p:cTn id="11" dur="1" fill="hold">
+                                          <p:stCondLst>
+                                            <p:cond delay="0"/>
+                                          </p:stCondLst>
+                                        </p:cTn>
+                                        <p:tgtEl>
+                                          <p:spTgt spid="3">
+                                            <p:txEl>
+                                              <p:pRg st="4" end="4"/>
+                                            </p:txEl>
+                                          </p:spTgt>
+                                        </p:tgtEl>
+                                        <p:attrNameLst>
+                                          <p:attrName>style.visibility</p:attrName>
+                                        </p:attrNameLst>
+                                      </p:cBhvr>
+                                      <p:to>
+                                        <p:strVal val="visible"/>
+                                      </p:to>
+                                    </p:set>
+                                    <p:animEffect transition="in" filter="dissolve">
+                                      <p:cBhvr>
+                                        <p:cTn id="12" dur="500"/>
+                                        <p:tgtEl>
+                                          <p:spTgt spid="3">
+                                            <p:txEl>
+                                              <p:pRg st="4" end="4"/>
+                                            </p:txEl>
+                                          </p:spTgt>
+                                        </p:tgtEl>
+                                      </p:cBhvr>
+                                    </p:animEffect>
+                                  </p:childTnLst>
+                                </p:cTn>
+                              </p:par>
+                            </p:childTnLst>
+                          </p:cTn>
+                        </p:par>
+                      </p:childTnLst>
+                    </p:cTn>
+                  </p:par>
+                </p:childTnLst>
+              </p:cTn>
+              <p:prevCondLst>
+                <p:cond evt="onPrev" delay="0">
+                  <p:tgtEl>
+                    <p:sldTgt/>
+                  </p:tgtEl>
+                </p:cond>
+              </p:prevCondLst>
+              <p:nextCondLst>
+                <p:cond evt="onNext" delay="0">
+                  <p:tgtEl>
+                    <p:sldTgt/>
+                  </p:tgtEl>
+                </p:cond>
+              </p:nextCondLst>
+            </p:seq>
+          </p:childTnLst>
+        </p:cTn>
+      </p:par>
+    </p:tnLst>
+  </p:timing>
+</p:sld>
+</file>
+
+<file path=ppt/slides/slide8.xml><?xml version="1.0" encoding="utf-8"?>
+<p:sld xmlns:a="http://schemas.openxmlformats.org/drawingml/2006/main" xmlns:r="http://schemas.openxmlformats.org/officeDocument/2006/relationships" xmlns:p="http://schemas.openxmlformats.org/presentationml/2006/main">
+  <p:cSld>
+    <p:spTree>
+      <p:nvGrpSpPr>
+        <p:cNvPr id="1" name=""/>
+        <p:cNvGrpSpPr/>
+        <p:nvPr/>
+      </p:nvGrpSpPr>
+      <p:grpSpPr>
+        <a:xfrm>
+          <a:off x="0" y="0"/>
+          <a:ext cx="0" cy="0"/>
+          <a:chOff x="0" y="0"/>
+          <a:chExt cx="0" cy="0"/>
+        </a:xfrm>
+      </p:grpSpPr>
+      <p:sp>
+        <p:nvSpPr>
+          <p:cNvPr id="2" name="Title 1"/>
+          <p:cNvSpPr>
+            <a:spLocks noGrp="1"/>
+          </p:cNvSpPr>
+          <p:nvPr>
+            <p:ph type="title"/>
+          </p:nvPr>
+        </p:nvSpPr>
+        <p:spPr/>
+        <p:txBody>
+          <a:bodyPr/>
+          <a:lstStyle/>
+          <a:p>
+            <a:r>
+              <a:rPr lang="en-US" dirty="0" smtClean="0"/>
+              <a:t>The Halting Problem</a:t>
+            </a:r>
+            <a:endParaRPr lang="en-US" dirty="0"/>
+          </a:p>
+        </p:txBody>
+      </p:sp>
+      <p:sp>
+        <p:nvSpPr>
+          <p:cNvPr id="3" name="Content Placeholder 2"/>
+          <p:cNvSpPr>
+            <a:spLocks noGrp="1"/>
+          </p:cNvSpPr>
+          <p:nvPr>
+            <p:ph idx="1"/>
+          </p:nvPr>
+        </p:nvSpPr>
+        <p:spPr>
+          <a:xfrm>
+            <a:off x="639555" y="1390139"/>
+            <a:ext cx="7868065" cy="5121739"/>
+          </a:xfrm>
+        </p:spPr>
+        <p:txBody>
+          <a:bodyPr/>
+          <a:lstStyle/>
+          <a:p>
+            <a:r>
+              <a:rPr lang="en-US" sz="4800" dirty="0"/>
+              <a:t>Modify </a:t>
+            </a:r>
+            <a:r>
+              <a:rPr lang="en-US" sz="4800" dirty="0">
+                <a:solidFill>
+                  <a:srgbClr val="9933FF"/>
+                </a:solidFill>
+              </a:rPr>
+              <a:t>Q</a:t>
+            </a:r>
+            <a:r>
+              <a:rPr lang="en-US" sz="4800" dirty="0"/>
+              <a:t> to </a:t>
+            </a:r>
+            <a:r>
+              <a:rPr lang="en-US" sz="4800" dirty="0">
+                <a:solidFill>
+                  <a:srgbClr val="9933FF"/>
+                </a:solidFill>
+              </a:rPr>
+              <a:t>Q'</a:t>
+            </a:r>
+            <a:r>
+              <a:rPr lang="en-US" sz="4800" dirty="0"/>
+              <a:t>:</a:t>
+            </a:r>
+          </a:p>
+          <a:p>
+            <a:r>
+              <a:rPr lang="en-US" sz="4800" dirty="0">
+                <a:solidFill>
+                  <a:srgbClr val="9933FF"/>
+                </a:solidFill>
+              </a:rPr>
+              <a:t>Q'</a:t>
+            </a:r>
+            <a:r>
+              <a:rPr lang="en-US" sz="4800" dirty="0"/>
+              <a:t>(</a:t>
+            </a:r>
+            <a:r>
+              <a:rPr lang="en-US" sz="4800" dirty="0">
+                <a:solidFill>
+                  <a:srgbClr val="0000FF"/>
+                </a:solidFill>
+              </a:rPr>
+              <a:t>s</a:t>
+            </a:r>
+            <a:r>
+              <a:rPr lang="en-US" sz="4800" dirty="0"/>
+              <a:t>) returns "</a:t>
+            </a:r>
+            <a:r>
+              <a:rPr lang="en-US" sz="4800" dirty="0" smtClean="0">
+                <a:solidFill>
+                  <a:srgbClr val="0000FF"/>
+                </a:solidFill>
+              </a:rPr>
+              <a:t>yes</a:t>
+            </a:r>
+            <a:r>
+              <a:rPr lang="en-US" sz="4800" dirty="0" smtClean="0"/>
+              <a:t>”</a:t>
+            </a:r>
+          </a:p>
+          <a:p>
+            <a:r>
+              <a:rPr lang="en-US" sz="4800" dirty="0" smtClean="0"/>
+              <a:t>      if </a:t>
+            </a:r>
+            <a:r>
+              <a:rPr lang="en-US" sz="4800" dirty="0">
+                <a:solidFill>
+                  <a:srgbClr val="9933FF"/>
+                </a:solidFill>
+              </a:rPr>
+              <a:t>Q</a:t>
+            </a:r>
+            <a:r>
+              <a:rPr lang="en-US" sz="4800" dirty="0"/>
+              <a:t>(</a:t>
+            </a:r>
+            <a:r>
+              <a:rPr lang="en-US" sz="4800" dirty="0">
+                <a:solidFill>
+                  <a:srgbClr val="0000FF"/>
+                </a:solidFill>
+              </a:rPr>
+              <a:t>s</a:t>
+            </a:r>
+            <a:r>
+              <a:rPr lang="en-US" sz="4800" dirty="0" smtClean="0"/>
+              <a:t>) returns </a:t>
+            </a:r>
+            <a:r>
+              <a:rPr lang="en-US" sz="4800" dirty="0"/>
+              <a:t>"</a:t>
+            </a:r>
+            <a:r>
+              <a:rPr lang="en-US" sz="4800" dirty="0">
+                <a:solidFill>
+                  <a:srgbClr val="0000FF"/>
+                </a:solidFill>
+              </a:rPr>
+              <a:t>no</a:t>
+            </a:r>
+            <a:r>
+              <a:rPr lang="en-US" sz="4800" dirty="0"/>
+              <a:t>"</a:t>
+            </a:r>
+          </a:p>
+          <a:p>
+            <a:r>
+              <a:rPr lang="en-US" sz="4800" dirty="0"/>
+              <a:t> </a:t>
+            </a:r>
+            <a:r>
+              <a:rPr lang="en-US" sz="4800" dirty="0">
+                <a:solidFill>
+                  <a:srgbClr val="9933FF"/>
+                </a:solidFill>
+              </a:rPr>
+              <a:t>Q'</a:t>
+            </a:r>
+            <a:r>
+              <a:rPr lang="en-US" sz="4800" dirty="0"/>
+              <a:t>(</a:t>
+            </a:r>
+            <a:r>
+              <a:rPr lang="en-US" sz="4800" dirty="0">
+                <a:solidFill>
+                  <a:srgbClr val="0000FF"/>
+                </a:solidFill>
+              </a:rPr>
+              <a:t>s</a:t>
+            </a:r>
+            <a:r>
+              <a:rPr lang="en-US" sz="4800" dirty="0"/>
+              <a:t>)</a:t>
+            </a:r>
+            <a:r>
+              <a:rPr lang="en-US" sz="4800" dirty="0" smtClean="0"/>
+              <a:t> returns nothing</a:t>
+            </a:r>
+          </a:p>
+          <a:p>
+            <a:r>
+              <a:rPr lang="en-US" sz="4800" dirty="0" smtClean="0"/>
+              <a:t>     if </a:t>
+            </a:r>
+            <a:r>
+              <a:rPr lang="en-US" sz="4800" dirty="0">
+                <a:solidFill>
+                  <a:srgbClr val="9933FF"/>
+                </a:solidFill>
+              </a:rPr>
+              <a:t>Q</a:t>
+            </a:r>
+            <a:r>
+              <a:rPr lang="en-US" sz="4800" dirty="0"/>
+              <a:t>(</a:t>
+            </a:r>
+            <a:r>
+              <a:rPr lang="en-US" sz="4800" dirty="0">
+                <a:solidFill>
+                  <a:srgbClr val="0000FF"/>
+                </a:solidFill>
+              </a:rPr>
+              <a:t>s</a:t>
+            </a:r>
+            <a:r>
+              <a:rPr lang="en-US" sz="4800" dirty="0"/>
+              <a:t>) </a:t>
+            </a:r>
+            <a:r>
+              <a:rPr lang="en-US" sz="4800" dirty="0" smtClean="0"/>
+              <a:t>returns </a:t>
+            </a:r>
+            <a:r>
+              <a:rPr lang="en-US" sz="4800" dirty="0"/>
+              <a:t>"</a:t>
+            </a:r>
+            <a:r>
+              <a:rPr lang="en-US" sz="4800" dirty="0" smtClean="0">
+                <a:solidFill>
+                  <a:srgbClr val="0000FF"/>
+                </a:solidFill>
+              </a:rPr>
+              <a:t>yes</a:t>
+            </a:r>
+            <a:r>
+              <a:rPr lang="en-US" sz="4800" dirty="0" smtClean="0"/>
+              <a:t>”</a:t>
+            </a:r>
+            <a:endParaRPr lang="en-US" sz="4800" dirty="0"/>
+          </a:p>
+        </p:txBody>
+      </p:sp>
+    </p:spTree>
+    <p:extLst>
+      <p:ext uri="{BB962C8B-B14F-4D97-AF65-F5344CB8AC3E}">
+        <p14:creationId xmlns:p14="http://schemas.microsoft.com/office/powerpoint/2010/main" val="3527254696"/>
+      </p:ext>
+    </p:extLst>
+  </p:cSld>
+  <p:clrMapOvr>
+    <a:masterClrMapping/>
+  </p:clrMapOvr>
+  <p:transition xmlns:p14="http://schemas.microsoft.com/office/powerpoint/2010/main" spd="slow">
+    <p:fade/>
+  </p:transition>
+  <p:timing>
+    <p:tnLst>
+      <p:par>
+        <p:cTn xmlns:p14="http://schemas.microsoft.com/office/powerpoint/2010/main" id="1" dur="indefinite" restart="never" nodeType="tmRoot">
+          <p:childTnLst>
+            <p:seq concurrent="1" nextAc="seek">
+              <p:cTn id="2" dur="indefinite" nodeType="mainSeq">
+                <p:childTnLst>
+                  <p:par>
+                    <p:cTn id="3" fill="hold">
+                      <p:stCondLst>
+                        <p:cond delay="indefinite"/>
+                      </p:stCondLst>
+                      <p:childTnLst>
+                        <p:par>
+                          <p:cTn id="4" fill="hold">
+                            <p:stCondLst>
+                              <p:cond delay="0"/>
+                            </p:stCondLst>
+                            <p:childTnLst>
+                              <p:par>
+                                <p:cTn id="5" presetID="9" presetClass="entr" presetSubtype="0" fill="hold" nodeType="clickEffect">
+                                  <p:stCondLst>
+                                    <p:cond delay="0"/>
+                                  </p:stCondLst>
+                                  <p:childTnLst>
+                                    <p:set>
+                                      <p:cBhvr>
+                                        <p:cTn id="6" dur="1" fill="hold">
+                                          <p:stCondLst>
+                                            <p:cond delay="0"/>
+                                          </p:stCondLst>
+                                        </p:cTn>
+                                        <p:tgtEl>
+                                          <p:spTgt spid="3">
+                                            <p:txEl>
+                                              <p:pRg st="1" end="1"/>
+                                            </p:txEl>
+                                          </p:spTgt>
+                                        </p:tgtEl>
+                                        <p:attrNameLst>
+                                          <p:attrName>style.visibility</p:attrName>
+                                        </p:attrNameLst>
+                                      </p:cBhvr>
+                                      <p:to>
+                                        <p:strVal val="visible"/>
+                                      </p:to>
+                                    </p:set>
+                                    <p:animEffect transition="in" filter="dissolve">
+                                      <p:cBhvr>
+                                        <p:cTn id="7" dur="500"/>
+                                        <p:tgtEl>
+                                          <p:spTgt spid="3">
+                                            <p:txEl>
+                                              <p:pRg st="1" end="1"/>
+                                            </p:txEl>
+                                          </p:spTgt>
+                                        </p:tgtEl>
+                                      </p:cBhvr>
+                                    </p:animEffect>
+                                  </p:childTnLst>
+                                </p:cTn>
+                              </p:par>
+                              <p:par>
+                                <p:cTn id="8" presetID="9" presetClass="entr" presetSubtype="0" fill="hold" nodeType="withEffect">
+                                  <p:stCondLst>
+                                    <p:cond delay="0"/>
+                                  </p:stCondLst>
+                                  <p:childTnLst>
+                                    <p:set>
+                                      <p:cBhvr>
+                                        <p:cTn id="9" dur="1" fill="hold">
+                                          <p:stCondLst>
+                                            <p:cond delay="0"/>
+                                          </p:stCondLst>
+                                        </p:cTn>
+                                        <p:tgtEl>
+                                          <p:spTgt spid="3">
+                                            <p:txEl>
+                                              <p:pRg st="2" end="2"/>
+                                            </p:txEl>
+                                          </p:spTgt>
+                                        </p:tgtEl>
+                                        <p:attrNameLst>
+                                          <p:attrName>style.visibility</p:attrName>
+                                        </p:attrNameLst>
+                                      </p:cBhvr>
+                                      <p:to>
+                                        <p:strVal val="visible"/>
+                                      </p:to>
+                                    </p:set>
+                                    <p:animEffect transition="in" filter="dissolve">
+                                      <p:cBhvr>
+                                        <p:cTn id="10" dur="500"/>
+                                        <p:tgtEl>
+                                          <p:spTgt spid="3">
+                                            <p:txEl>
+                                              <p:pRg st="2" end="2"/>
+                                            </p:txEl>
+                                          </p:spTgt>
+                                        </p:tgtEl>
+                                      </p:cBhvr>
+                                    </p:animEffect>
+                                  </p:childTnLst>
+                                </p:cTn>
+                              </p:par>
+                            </p:childTnLst>
+                          </p:cTn>
+                        </p:par>
+                      </p:childTnLst>
+                    </p:cTn>
+                  </p:par>
+                  <p:par>
+                    <p:cTn id="11" fill="hold">
+                      <p:stCondLst>
+                        <p:cond delay="indefinite"/>
+                      </p:stCondLst>
+                      <p:childTnLst>
+                        <p:par>
+                          <p:cTn id="12" fill="hold">
+                            <p:stCondLst>
+                              <p:cond delay="0"/>
+                            </p:stCondLst>
+                            <p:childTnLst>
+                              <p:par>
+                                <p:cTn id="13" presetID="9" presetClass="entr" presetSubtype="0" fill="hold" nodeType="clickEffect">
+                                  <p:stCondLst>
+                                    <p:cond delay="0"/>
+                                  </p:stCondLst>
+                                  <p:childTnLst>
+                                    <p:set>
+                                      <p:cBhvr>
+                                        <p:cTn id="14" dur="1" fill="hold">
+                                          <p:stCondLst>
+                                            <p:cond delay="0"/>
+                                          </p:stCondLst>
+                                        </p:cTn>
+                                        <p:tgtEl>
+                                          <p:spTgt spid="3">
+                                            <p:txEl>
+                                              <p:pRg st="3" end="3"/>
+                                            </p:txEl>
+                                          </p:spTgt>
+                                        </p:tgtEl>
+                                        <p:attrNameLst>
+                                          <p:attrName>style.visibility</p:attrName>
+                                        </p:attrNameLst>
+                                      </p:cBhvr>
+                                      <p:to>
+                                        <p:strVal val="visible"/>
+                                      </p:to>
+                                    </p:set>
+                                    <p:animEffect transition="in" filter="dissolve">
+                                      <p:cBhvr>
+                                        <p:cTn id="15" dur="500"/>
+                                        <p:tgtEl>
+                                          <p:spTgt spid="3">
+                                            <p:txEl>
+                                              <p:pRg st="3" end="3"/>
+                                            </p:txEl>
+                                          </p:spTgt>
+                                        </p:tgtEl>
+                                      </p:cBhvr>
+                                    </p:animEffect>
+                                  </p:childTnLst>
+                                </p:cTn>
+                              </p:par>
+                              <p:par>
+                                <p:cTn id="16" presetID="9" presetClass="entr" presetSubtype="0" fill="hold" nodeType="withEffect">
+                                  <p:stCondLst>
+                                    <p:cond delay="0"/>
+                                  </p:stCondLst>
+                                  <p:childTnLst>
+                                    <p:set>
+                                      <p:cBhvr>
+                                        <p:cTn id="17" dur="1" fill="hold">
+                                          <p:stCondLst>
+                                            <p:cond delay="0"/>
+                                          </p:stCondLst>
+                                        </p:cTn>
+                                        <p:tgtEl>
+                                          <p:spTgt spid="3">
+                                            <p:txEl>
+                                              <p:pRg st="4" end="4"/>
+                                            </p:txEl>
+                                          </p:spTgt>
+                                        </p:tgtEl>
+                                        <p:attrNameLst>
+                                          <p:attrName>style.visibility</p:attrName>
+                                        </p:attrNameLst>
+                                      </p:cBhvr>
+                                      <p:to>
+                                        <p:strVal val="visible"/>
+                                      </p:to>
+                                    </p:set>
+                                    <p:animEffect transition="in" filter="dissolve">
+                                      <p:cBhvr>
+                                        <p:cTn id="18" dur="500"/>
+                                        <p:tgtEl>
+                                          <p:spTgt spid="3">
+                                            <p:txEl>
+                                              <p:pRg st="4" end="4"/>
+                                            </p:txEl>
+                                          </p:spTgt>
+                                        </p:tgtEl>
+                                      </p:cBhvr>
+                                    </p:animEffect>
+                                  </p:childTnLst>
+                                </p:cTn>
+                              </p:par>
+                            </p:childTnLst>
+                          </p:cTn>
+                        </p:par>
+                      </p:childTnLst>
+                    </p:cTn>
+                  </p:par>
+                </p:childTnLst>
+              </p:cTn>
+              <p:prevCondLst>
+                <p:cond evt="onPrev" delay="0">
+                  <p:tgtEl>
+                    <p:sldTgt/>
+                  </p:tgtEl>
+                </p:cond>
+              </p:prevCondLst>
+              <p:nextCondLst>
+                <p:cond evt="onNext" delay="0">
+                  <p:tgtEl>
+                    <p:sldTgt/>
+                  </p:tgtEl>
+                </p:cond>
+              </p:nextCondLst>
+            </p:seq>
+          </p:childTnLst>
+        </p:cTn>
+      </p:par>
+    </p:tnLst>
+  </p:timing>
+</p:sld>
+</file>
+
+<file path=ppt/slides/slide9.xml><?xml version="1.0" encoding="utf-8"?>
+<p:sld xmlns:a="http://schemas.openxmlformats.org/drawingml/2006/main" xmlns:r="http://schemas.openxmlformats.org/officeDocument/2006/relationships" xmlns:p="http://schemas.openxmlformats.org/presentationml/2006/main">
+  <p:cSld>
+    <p:spTree>
+      <p:nvGrpSpPr>
+        <p:cNvPr id="1" name=""/>
+        <p:cNvGrpSpPr/>
+        <p:nvPr/>
+      </p:nvGrpSpPr>
+      <p:grpSpPr>
+        <a:xfrm>
+          <a:off x="0" y="0"/>
+          <a:ext cx="0" cy="0"/>
+          <a:chOff x="0" y="0"/>
+          <a:chExt cx="0" cy="0"/>
+        </a:xfrm>
+      </p:grpSpPr>
+      <p:sp>
+        <p:nvSpPr>
+          <p:cNvPr id="2" name="Title 1"/>
+          <p:cNvSpPr>
+            <a:spLocks noGrp="1"/>
+          </p:cNvSpPr>
+          <p:nvPr>
+            <p:ph type="title"/>
+          </p:nvPr>
+        </p:nvSpPr>
+        <p:spPr>
+          <a:xfrm>
+            <a:off x="1660549" y="363538"/>
+            <a:ext cx="6794500" cy="1003300"/>
+          </a:xfrm>
+        </p:spPr>
+        <p:txBody>
+          <a:bodyPr/>
+          <a:lstStyle/>
+          <a:p>
+            <a:r>
+              <a:rPr lang="en-US" dirty="0" smtClean="0"/>
+              <a:t>The Halting Problem</a:t>
+            </a:r>
+            <a:endParaRPr lang="en-US" dirty="0"/>
+          </a:p>
+        </p:txBody>
+      </p:sp>
+      <p:sp>
+        <p:nvSpPr>
+          <p:cNvPr id="3" name="Content Placeholder 2"/>
+          <p:cNvSpPr>
+            <a:spLocks noGrp="1"/>
+          </p:cNvSpPr>
+          <p:nvPr>
+            <p:ph idx="1"/>
+          </p:nvPr>
+        </p:nvSpPr>
+        <p:spPr>
+          <a:xfrm>
+            <a:off x="439025" y="1390139"/>
+            <a:ext cx="8307513" cy="3966405"/>
+          </a:xfrm>
+        </p:spPr>
+        <p:txBody>
+          <a:bodyPr/>
+          <a:lstStyle/>
+          <a:p>
+            <a:r>
+              <a:rPr lang="en-US" sz="6000" dirty="0"/>
+              <a:t>So</a:t>
+            </a:r>
+          </a:p>
+          <a:p>
+            <a:r>
+              <a:rPr lang="en-US" sz="6000" dirty="0"/>
+              <a:t> </a:t>
+            </a:r>
+            <a:r>
+              <a:rPr lang="en-US" sz="6000" dirty="0" smtClean="0">
+                <a:solidFill>
+                  <a:srgbClr val="0000FF"/>
+                </a:solidFill>
+              </a:rPr>
+              <a:t>s</a:t>
+            </a:r>
+            <a:r>
+              <a:rPr lang="en-US" sz="6000" dirty="0" smtClean="0"/>
+              <a:t> </a:t>
+            </a:r>
+            <a:r>
+              <a:rPr lang="en-US" sz="6000" dirty="0">
+                <a:solidFill>
+                  <a:srgbClr val="F50802"/>
+                </a:solidFill>
+              </a:rPr>
+              <a:t>HALTS</a:t>
+            </a:r>
+            <a:r>
+              <a:rPr lang="en-US" sz="6000" dirty="0"/>
+              <a:t> </a:t>
+            </a:r>
+            <a:r>
+              <a:rPr lang="en-US" sz="6000" dirty="0" err="1" smtClean="0"/>
+              <a:t>iff</a:t>
+            </a:r>
+            <a:endParaRPr lang="en-US" sz="6000" dirty="0" smtClean="0"/>
+          </a:p>
+          <a:p>
+            <a:r>
+              <a:rPr lang="en-US" sz="6000" dirty="0">
+                <a:solidFill>
+                  <a:srgbClr val="9933FF"/>
+                </a:solidFill>
+              </a:rPr>
+              <a:t> </a:t>
+            </a:r>
+            <a:r>
+              <a:rPr lang="en-US" sz="6000" dirty="0" smtClean="0">
+                <a:solidFill>
+                  <a:srgbClr val="9933FF"/>
+                </a:solidFill>
+              </a:rPr>
+              <a:t>Q'</a:t>
+            </a:r>
+            <a:r>
+              <a:rPr lang="en-US" sz="6000" dirty="0"/>
+              <a:t>(</a:t>
+            </a:r>
+            <a:r>
+              <a:rPr lang="en-US" sz="6000" dirty="0">
+                <a:solidFill>
+                  <a:srgbClr val="0000FF"/>
+                </a:solidFill>
+              </a:rPr>
+              <a:t>s</a:t>
+            </a:r>
+            <a:r>
+              <a:rPr lang="en-US" sz="6000" dirty="0"/>
+              <a:t>) returns nothing</a:t>
+            </a:r>
+          </a:p>
+        </p:txBody>
+      </p:sp>
+    </p:spTree>
+    <p:extLst>
+      <p:ext uri="{BB962C8B-B14F-4D97-AF65-F5344CB8AC3E}">
+        <p14:creationId xmlns:p14="http://schemas.microsoft.com/office/powerpoint/2010/main" val="3813480936"/>
+      </p:ext>
+    </p:extLst>
+  </p:cSld>
+  <p:clrMapOvr>
+    <a:masterClrMapping/>
+  </p:clrMapOvr>
+  <p:transition xmlns:p14="http://schemas.microsoft.com/office/powerpoint/2010/main" spd="slow">
+    <p:fade/>
+  </p:transition>
+  <p:timing>
+    <p:tnLst>
+      <p:par>
+        <p:cTn xmlns:p14="http://schemas.microsoft.com/office/powerpoint/2010/main" id="1" dur="indefinite" restart="never" nodeType="tmRoot">
+          <p:childTnLst>
+            <p:seq concurrent="1" nextAc="seek">
+              <p:cTn id="2" dur="indefinite" nodeType="mainSeq">
+                <p:childTnLst>
+                  <p:par>
+                    <p:cTn id="3" fill="hold">
+                      <p:stCondLst>
+                        <p:cond delay="indefinite"/>
+                      </p:stCondLst>
+                      <p:childTnLst>
+                        <p:par>
+                          <p:cTn id="4" fill="hold">
+                            <p:stCondLst>
+                              <p:cond delay="0"/>
+                            </p:stCondLst>
+                            <p:childTnLst>
+                              <p:par>
+                                <p:cTn id="5" presetID="9" presetClass="entr" presetSubtype="0" fill="hold" nodeType="clickEffect">
+                                  <p:stCondLst>
+                                    <p:cond delay="0"/>
+                                  </p:stCondLst>
+                                  <p:childTnLst>
+                                    <p:set>
+                                      <p:cBhvr>
+                                        <p:cTn id="6" dur="1" fill="hold">
+                                          <p:stCondLst>
+                                            <p:cond delay="0"/>
+                                          </p:stCondLst>
+                                        </p:cTn>
+                                        <p:tgtEl>
+                                          <p:spTgt spid="3">
+                                            <p:txEl>
+                                              <p:pRg st="2" end="2"/>
+                                            </p:txEl>
+                                          </p:spTgt>
+                                        </p:tgtEl>
+                                        <p:attrNameLst>
+                                          <p:attrName>style.visibility</p:attrName>
+                                        </p:attrNameLst>
+                                      </p:cBhvr>
+                                      <p:to>
+                                        <p:strVal val="visible"/>
+                                      </p:to>
+                                    </p:set>
+                                    <p:animEffect transition="in" filter="dissolve">
+                                      <p:cBhvr>
+                                        <p:cTn id="7" dur="500"/>
+                                        <p:tgtEl>
+                                          <p:spTgt spid="3">
+                                            <p:txEl>
+                                              <p:pRg st="2" end="2"/>
+                                            </p:txEl>
+                                          </p:spTgt>
+                                        </p:tgtEl>
+                                      </p:cBhvr>
+                                    </p:animEffect>
+                                  </p:childTnLst>
+                                </p:cTn>
+                              </p:par>
+                            </p:childTnLst>
+                          </p:cTn>
+                        </p:par>
+                      </p:childTnLst>
+                    </p:cTn>
+                  </p:par>
+                </p:childTnLst>
+              </p:cTn>
+              <p:prevCondLst>
+                <p:cond evt="onPrev" delay="0">
+                  <p:tgtEl>
+                    <p:sldTgt/>
+                  </p:tgtEl>
+                </p:cond>
+              </p:prevCondLst>
+              <p:nextCondLst>
+                <p:cond evt="onNext" delay="0">
+                  <p:tgtEl>
+                    <p:sldTgt/>
+                  </p:tgtEl>
+                </p:cond>
+              </p:nextCondLst>
+            </p:seq>
+          </p:childTnLst>
+        </p:cTn>
       </p:par>
     </p:tnLst>
   </p:timing>

</xml_diff>